<commit_message>
Ajout du rest dans les slides
</commit_message>
<xml_diff>
--- a/protobuf-powered.pptx
+++ b/protobuf-powered.pptx
@@ -14,13 +14,27 @@
     <p:sldId id="262" r:id="rId8"/>
     <p:sldId id="263" r:id="rId9"/>
     <p:sldId id="264" r:id="rId10"/>
-    <p:sldId id="265" r:id="rId11"/>
-    <p:sldId id="266" r:id="rId12"/>
-    <p:sldId id="267" r:id="rId13"/>
-    <p:sldId id="268" r:id="rId14"/>
-    <p:sldId id="269" r:id="rId15"/>
-    <p:sldId id="270" r:id="rId16"/>
-    <p:sldId id="271" r:id="rId17"/>
+    <p:sldId id="272" r:id="rId11"/>
+    <p:sldId id="265" r:id="rId12"/>
+    <p:sldId id="266" r:id="rId13"/>
+    <p:sldId id="267" r:id="rId14"/>
+    <p:sldId id="268" r:id="rId15"/>
+    <p:sldId id="269" r:id="rId16"/>
+    <p:sldId id="273" r:id="rId17"/>
+    <p:sldId id="276" r:id="rId18"/>
+    <p:sldId id="275" r:id="rId19"/>
+    <p:sldId id="274" r:id="rId20"/>
+    <p:sldId id="278" r:id="rId21"/>
+    <p:sldId id="277" r:id="rId22"/>
+    <p:sldId id="279" r:id="rId23"/>
+    <p:sldId id="280" r:id="rId24"/>
+    <p:sldId id="281" r:id="rId25"/>
+    <p:sldId id="282" r:id="rId26"/>
+    <p:sldId id="283" r:id="rId27"/>
+    <p:sldId id="285" r:id="rId28"/>
+    <p:sldId id="286" r:id="rId29"/>
+    <p:sldId id="270" r:id="rId30"/>
+    <p:sldId id="271" r:id="rId31"/>
   </p:sldIdLst>
   <p:sldSz cx="9144000" cy="6858000" type="screen4x3"/>
   <p:notesSz cx="6858000" cy="9144000"/>
@@ -303,7 +317,7 @@
           <a:p>
             <a:fld id="{10B3F19B-9563-F042-816E-6C7946FA7A3B}" type="datetimeFigureOut">
               <a:rPr lang="fr-FR" smtClean="0"/>
-              <a:t>02/04/16</a:t>
+              <a:t>08/04/16</a:t>
             </a:fld>
             <a:endParaRPr lang="fr-FR"/>
           </a:p>
@@ -473,7 +487,7 @@
           <a:p>
             <a:fld id="{10B3F19B-9563-F042-816E-6C7946FA7A3B}" type="datetimeFigureOut">
               <a:rPr lang="fr-FR" smtClean="0"/>
-              <a:t>02/04/16</a:t>
+              <a:t>08/04/16</a:t>
             </a:fld>
             <a:endParaRPr lang="fr-FR"/>
           </a:p>
@@ -653,7 +667,7 @@
           <a:p>
             <a:fld id="{10B3F19B-9563-F042-816E-6C7946FA7A3B}" type="datetimeFigureOut">
               <a:rPr lang="fr-FR" smtClean="0"/>
-              <a:t>02/04/16</a:t>
+              <a:t>08/04/16</a:t>
             </a:fld>
             <a:endParaRPr lang="fr-FR"/>
           </a:p>
@@ -823,7 +837,7 @@
           <a:p>
             <a:fld id="{10B3F19B-9563-F042-816E-6C7946FA7A3B}" type="datetimeFigureOut">
               <a:rPr lang="fr-FR" smtClean="0"/>
-              <a:t>02/04/16</a:t>
+              <a:t>08/04/16</a:t>
             </a:fld>
             <a:endParaRPr lang="fr-FR"/>
           </a:p>
@@ -1069,7 +1083,7 @@
           <a:p>
             <a:fld id="{10B3F19B-9563-F042-816E-6C7946FA7A3B}" type="datetimeFigureOut">
               <a:rPr lang="fr-FR" smtClean="0"/>
-              <a:t>02/04/16</a:t>
+              <a:t>08/04/16</a:t>
             </a:fld>
             <a:endParaRPr lang="fr-FR"/>
           </a:p>
@@ -1357,7 +1371,7 @@
           <a:p>
             <a:fld id="{10B3F19B-9563-F042-816E-6C7946FA7A3B}" type="datetimeFigureOut">
               <a:rPr lang="fr-FR" smtClean="0"/>
-              <a:t>02/04/16</a:t>
+              <a:t>08/04/16</a:t>
             </a:fld>
             <a:endParaRPr lang="fr-FR"/>
           </a:p>
@@ -1779,7 +1793,7 @@
           <a:p>
             <a:fld id="{10B3F19B-9563-F042-816E-6C7946FA7A3B}" type="datetimeFigureOut">
               <a:rPr lang="fr-FR" smtClean="0"/>
-              <a:t>02/04/16</a:t>
+              <a:t>08/04/16</a:t>
             </a:fld>
             <a:endParaRPr lang="fr-FR"/>
           </a:p>
@@ -1897,7 +1911,7 @@
           <a:p>
             <a:fld id="{10B3F19B-9563-F042-816E-6C7946FA7A3B}" type="datetimeFigureOut">
               <a:rPr lang="fr-FR" smtClean="0"/>
-              <a:t>02/04/16</a:t>
+              <a:t>08/04/16</a:t>
             </a:fld>
             <a:endParaRPr lang="fr-FR"/>
           </a:p>
@@ -1992,7 +2006,7 @@
           <a:p>
             <a:fld id="{10B3F19B-9563-F042-816E-6C7946FA7A3B}" type="datetimeFigureOut">
               <a:rPr lang="fr-FR" smtClean="0"/>
-              <a:t>02/04/16</a:t>
+              <a:t>08/04/16</a:t>
             </a:fld>
             <a:endParaRPr lang="fr-FR"/>
           </a:p>
@@ -2269,7 +2283,7 @@
           <a:p>
             <a:fld id="{10B3F19B-9563-F042-816E-6C7946FA7A3B}" type="datetimeFigureOut">
               <a:rPr lang="fr-FR" smtClean="0"/>
-              <a:t>02/04/16</a:t>
+              <a:t>08/04/16</a:t>
             </a:fld>
             <a:endParaRPr lang="fr-FR"/>
           </a:p>
@@ -2522,7 +2536,7 @@
           <a:p>
             <a:fld id="{10B3F19B-9563-F042-816E-6C7946FA7A3B}" type="datetimeFigureOut">
               <a:rPr lang="fr-FR" smtClean="0"/>
-              <a:t>02/04/16</a:t>
+              <a:t>08/04/16</a:t>
             </a:fld>
             <a:endParaRPr lang="fr-FR"/>
           </a:p>
@@ -2735,7 +2749,7 @@
           <a:p>
             <a:fld id="{10B3F19B-9563-F042-816E-6C7946FA7A3B}" type="datetimeFigureOut">
               <a:rPr lang="fr-FR" smtClean="0"/>
-              <a:t>02/04/16</a:t>
+              <a:t>08/04/16</a:t>
             </a:fld>
             <a:endParaRPr lang="fr-FR"/>
           </a:p>
@@ -3227,12 +3241,9 @@
           <a:p>
             <a:r>
               <a:rPr lang="fr-FR" dirty="0" smtClean="0"/>
-              <a:t>Format sérialis</a:t>
-            </a:r>
-            <a:r>
-              <a:rPr lang="fr-FR" dirty="0"/>
-              <a:t>é</a:t>
-            </a:r>
+              <a:t>Générateur de code</a:t>
+            </a:r>
+            <a:endParaRPr lang="fr-FR" dirty="0"/>
           </a:p>
         </p:txBody>
       </p:sp>
@@ -3251,41 +3262,6 @@
           <a:bodyPr/>
           <a:lstStyle/>
           <a:p>
-            <a:r>
-              <a:rPr lang="fr-FR" dirty="0" smtClean="0"/>
-              <a:t>Format Binaire -&gt; non </a:t>
-            </a:r>
-            <a:r>
-              <a:rPr lang="fr-FR" dirty="0" err="1" smtClean="0"/>
-              <a:t>human</a:t>
-            </a:r>
-            <a:r>
-              <a:rPr lang="fr-FR" dirty="0" smtClean="0"/>
-              <a:t> </a:t>
-            </a:r>
-            <a:r>
-              <a:rPr lang="fr-FR" dirty="0" err="1" smtClean="0"/>
-              <a:t>readable</a:t>
-            </a:r>
-            <a:endParaRPr lang="fr-FR" dirty="0" smtClean="0"/>
-          </a:p>
-          <a:p>
-            <a:endParaRPr lang="fr-FR" dirty="0"/>
-          </a:p>
-          <a:p>
-            <a:r>
-              <a:rPr lang="fr-FR" dirty="0" smtClean="0"/>
-              <a:t>Basé sur l’ordre des champs et leur taille</a:t>
-            </a:r>
-          </a:p>
-          <a:p>
-            <a:endParaRPr lang="fr-FR" dirty="0"/>
-          </a:p>
-          <a:p>
-            <a:r>
-              <a:rPr lang="fr-FR" dirty="0" smtClean="0"/>
-              <a:t>Relativement performant</a:t>
-            </a:r>
             <a:endParaRPr lang="fr-FR" dirty="0"/>
           </a:p>
         </p:txBody>
@@ -3293,7 +3269,7 @@
     </p:spTree>
     <p:extLst>
       <p:ext uri="{BB962C8B-B14F-4D97-AF65-F5344CB8AC3E}">
-        <p14:creationId xmlns:p14="http://schemas.microsoft.com/office/powerpoint/2010/main" val="1725805716"/>
+        <p14:creationId xmlns:p14="http://schemas.microsoft.com/office/powerpoint/2010/main" val="402769495"/>
       </p:ext>
     </p:extLst>
   </p:cSld>
@@ -3337,30 +3313,55 @@
           <a:p>
             <a:r>
               <a:rPr lang="fr-FR" dirty="0" smtClean="0"/>
-              <a:t>Avantages</a:t>
-            </a:r>
+              <a:t>Format sérialis</a:t>
+            </a:r>
+            <a:r>
+              <a:rPr lang="fr-FR" dirty="0"/>
+              <a:t>é</a:t>
+            </a:r>
+          </a:p>
+        </p:txBody>
+      </p:sp>
+      <p:sp>
+        <p:nvSpPr>
+          <p:cNvPr id="3" name="Espace réservé du contenu 2"/>
+          <p:cNvSpPr>
+            <a:spLocks noGrp="1"/>
+          </p:cNvSpPr>
+          <p:nvPr>
+            <p:ph idx="1"/>
+          </p:nvPr>
+        </p:nvSpPr>
+        <p:spPr/>
+        <p:txBody>
+          <a:bodyPr/>
+          <a:lstStyle/>
+          <a:p>
+            <a:r>
+              <a:rPr lang="fr-FR" dirty="0" smtClean="0"/>
+              <a:t>Format Binaire -&gt; non </a:t>
+            </a:r>
+            <a:r>
+              <a:rPr lang="fr-FR" dirty="0" err="1" smtClean="0"/>
+              <a:t>human</a:t>
+            </a:r>
+            <a:r>
+              <a:rPr lang="fr-FR" dirty="0" smtClean="0"/>
+              <a:t> </a:t>
+            </a:r>
+            <a:r>
+              <a:rPr lang="fr-FR" dirty="0" err="1" smtClean="0"/>
+              <a:t>readable</a:t>
+            </a:r>
+            <a:endParaRPr lang="fr-FR" dirty="0" smtClean="0"/>
+          </a:p>
+          <a:p>
             <a:endParaRPr lang="fr-FR" dirty="0"/>
           </a:p>
-        </p:txBody>
-      </p:sp>
-      <p:sp>
-        <p:nvSpPr>
-          <p:cNvPr id="3" name="Espace réservé du contenu 2"/>
-          <p:cNvSpPr>
-            <a:spLocks noGrp="1"/>
-          </p:cNvSpPr>
-          <p:nvPr>
-            <p:ph idx="1"/>
-          </p:nvPr>
-        </p:nvSpPr>
-        <p:spPr/>
-        <p:txBody>
-          <a:bodyPr/>
-          <a:lstStyle/>
-          <a:p>
-            <a:r>
-              <a:rPr lang="fr-FR" dirty="0" smtClean="0"/>
-              <a:t>Immutable</a:t>
+          <a:p>
+            <a:r>
+              <a:rPr lang="fr-FR" dirty="0" smtClean="0"/>
+              <a:t>Basé sur l’ordre des champs et leur taille</a:t>
             </a:r>
           </a:p>
           <a:p>
@@ -3369,43 +3370,7 @@
           <a:p>
             <a:r>
               <a:rPr lang="fr-FR" dirty="0" smtClean="0"/>
-              <a:t>Simple à écrire</a:t>
-            </a:r>
-          </a:p>
-          <a:p>
-            <a:pPr lvl="1"/>
-            <a:r>
-              <a:rPr lang="fr-FR" dirty="0" smtClean="0"/>
-              <a:t>Création</a:t>
-            </a:r>
-          </a:p>
-          <a:p>
-            <a:pPr lvl="1"/>
-            <a:r>
-              <a:rPr lang="fr-FR" dirty="0" smtClean="0"/>
-              <a:t>Modification</a:t>
-            </a:r>
-          </a:p>
-          <a:p>
-            <a:pPr lvl="1"/>
-            <a:endParaRPr lang="fr-FR" dirty="0"/>
-          </a:p>
-          <a:p>
-            <a:r>
-              <a:rPr lang="fr-FR" dirty="0" smtClean="0"/>
-              <a:t>Pas mal de </a:t>
-            </a:r>
-            <a:r>
-              <a:rPr lang="fr-FR" dirty="0" err="1" smtClean="0"/>
-              <a:t>built</a:t>
-            </a:r>
-            <a:r>
-              <a:rPr lang="fr-FR" dirty="0" smtClean="0"/>
-              <a:t>-in </a:t>
-            </a:r>
-            <a:r>
-              <a:rPr lang="fr-FR" dirty="0" err="1" smtClean="0"/>
-              <a:t>methods</a:t>
+              <a:t>Relativement performant</a:t>
             </a:r>
             <a:endParaRPr lang="fr-FR" dirty="0"/>
           </a:p>
@@ -3414,7 +3379,7 @@
     </p:spTree>
     <p:extLst>
       <p:ext uri="{BB962C8B-B14F-4D97-AF65-F5344CB8AC3E}">
-        <p14:creationId xmlns:p14="http://schemas.microsoft.com/office/powerpoint/2010/main" val="3481788304"/>
+        <p14:creationId xmlns:p14="http://schemas.microsoft.com/office/powerpoint/2010/main" val="1725805716"/>
       </p:ext>
     </p:extLst>
   </p:cSld>
@@ -3458,7 +3423,7 @@
           <a:p>
             <a:r>
               <a:rPr lang="fr-FR" dirty="0" smtClean="0"/>
-              <a:t>Inconvénients</a:t>
+              <a:t>Avantages</a:t>
             </a:r>
             <a:endParaRPr lang="fr-FR" dirty="0"/>
           </a:p>
@@ -3481,58 +3446,52 @@
           <a:p>
             <a:r>
               <a:rPr lang="fr-FR" dirty="0" smtClean="0"/>
-              <a:t>Non </a:t>
+              <a:t>Immutable</a:t>
+            </a:r>
+          </a:p>
+          <a:p>
+            <a:endParaRPr lang="fr-FR" dirty="0"/>
+          </a:p>
+          <a:p>
+            <a:r>
+              <a:rPr lang="fr-FR" dirty="0" smtClean="0"/>
+              <a:t>Simple à écrire</a:t>
+            </a:r>
+          </a:p>
+          <a:p>
+            <a:pPr lvl="1"/>
+            <a:r>
+              <a:rPr lang="fr-FR" dirty="0" smtClean="0"/>
+              <a:t>Création</a:t>
+            </a:r>
+          </a:p>
+          <a:p>
+            <a:pPr lvl="1"/>
+            <a:r>
+              <a:rPr lang="fr-FR" dirty="0" smtClean="0"/>
+              <a:t>Modification</a:t>
+            </a:r>
+          </a:p>
+          <a:p>
+            <a:pPr lvl="1"/>
+            <a:endParaRPr lang="fr-FR" dirty="0"/>
+          </a:p>
+          <a:p>
+            <a:r>
+              <a:rPr lang="fr-FR" dirty="0" smtClean="0"/>
+              <a:t>Pas mal de </a:t>
             </a:r>
             <a:r>
               <a:rPr lang="fr-FR" dirty="0" err="1" smtClean="0"/>
-              <a:t>Human</a:t>
-            </a:r>
-            <a:r>
-              <a:rPr lang="fr-FR" dirty="0" smtClean="0"/>
-              <a:t> </a:t>
+              <a:t>built</a:t>
+            </a:r>
+            <a:r>
+              <a:rPr lang="fr-FR" dirty="0" smtClean="0"/>
+              <a:t>-in </a:t>
             </a:r>
             <a:r>
               <a:rPr lang="fr-FR" dirty="0" err="1" smtClean="0"/>
-              <a:t>Readable</a:t>
-            </a:r>
-            <a:endParaRPr lang="fr-FR" dirty="0" smtClean="0"/>
-          </a:p>
-          <a:p>
-            <a:endParaRPr lang="fr-FR" dirty="0"/>
-          </a:p>
-          <a:p>
-            <a:r>
-              <a:rPr lang="fr-FR" dirty="0" smtClean="0"/>
-              <a:t>Pas utilisé par tout le monde</a:t>
-            </a:r>
-          </a:p>
-          <a:p>
-            <a:pPr lvl="1"/>
-            <a:r>
-              <a:rPr lang="fr-FR" dirty="0" smtClean="0"/>
-              <a:t>En particulier sur les </a:t>
-            </a:r>
-            <a:r>
-              <a:rPr lang="fr-FR" dirty="0" err="1" smtClean="0"/>
-              <a:t>WebServices</a:t>
-            </a:r>
-            <a:endParaRPr lang="fr-FR" dirty="0"/>
-          </a:p>
-          <a:p>
-            <a:endParaRPr lang="fr-FR" dirty="0" smtClean="0"/>
-          </a:p>
-          <a:p>
-            <a:r>
-              <a:rPr lang="fr-FR" dirty="0" smtClean="0"/>
-              <a:t>Pas facilement </a:t>
-            </a:r>
-            <a:r>
-              <a:rPr lang="fr-FR" dirty="0" err="1" smtClean="0"/>
-              <a:t>Etendable</a:t>
-            </a:r>
-            <a:r>
-              <a:rPr lang="fr-FR" dirty="0" smtClean="0"/>
-              <a:t> (hormis à partir d’un fichier proto)</a:t>
+              <a:t>methods</a:t>
             </a:r>
             <a:endParaRPr lang="fr-FR" dirty="0"/>
           </a:p>
@@ -3541,7 +3500,7 @@
     </p:spTree>
     <p:extLst>
       <p:ext uri="{BB962C8B-B14F-4D97-AF65-F5344CB8AC3E}">
-        <p14:creationId xmlns:p14="http://schemas.microsoft.com/office/powerpoint/2010/main" val="4117981998"/>
+        <p14:creationId xmlns:p14="http://schemas.microsoft.com/office/powerpoint/2010/main" val="3481788304"/>
       </p:ext>
     </p:extLst>
   </p:cSld>
@@ -3585,7 +3544,7 @@
           <a:p>
             <a:r>
               <a:rPr lang="fr-FR" dirty="0" smtClean="0"/>
-              <a:t>Et Maintenant ?</a:t>
+              <a:t>Inconvénients</a:t>
             </a:r>
             <a:endParaRPr lang="fr-FR" dirty="0"/>
           </a:p>
@@ -3608,20 +3567,21 @@
           <a:p>
             <a:r>
               <a:rPr lang="fr-FR" dirty="0" smtClean="0"/>
-              <a:t>On aime </a:t>
+              <a:t>Non </a:t>
             </a:r>
             <a:r>
               <a:rPr lang="fr-FR" dirty="0" err="1" smtClean="0"/>
-              <a:t>protobuf</a:t>
-            </a:r>
-            <a:r>
-              <a:rPr lang="fr-FR" dirty="0"/>
+              <a:t>Human</a:t>
+            </a:r>
+            <a:r>
+              <a:rPr lang="fr-FR" dirty="0" smtClean="0"/>
               <a:t> </a:t>
             </a:r>
             <a:r>
-              <a:rPr lang="fr-FR" dirty="0" smtClean="0"/>
-              <a:t>pour ses avantages</a:t>
-            </a:r>
+              <a:rPr lang="fr-FR" dirty="0" err="1" smtClean="0"/>
+              <a:t>Readable</a:t>
+            </a:r>
+            <a:endParaRPr lang="fr-FR" dirty="0" smtClean="0"/>
           </a:p>
           <a:p>
             <a:endParaRPr lang="fr-FR" dirty="0"/>
@@ -3629,16 +3589,36 @@
           <a:p>
             <a:r>
               <a:rPr lang="fr-FR" dirty="0" smtClean="0"/>
-              <a:t>On l’aime moins pour ses inconvénients</a:t>
-            </a:r>
-          </a:p>
-          <a:p>
+              <a:t>Pas utilisé par tout le monde</a:t>
+            </a:r>
+          </a:p>
+          <a:p>
+            <a:pPr lvl="1"/>
+            <a:r>
+              <a:rPr lang="fr-FR" dirty="0" smtClean="0"/>
+              <a:t>En particulier sur les </a:t>
+            </a:r>
+            <a:r>
+              <a:rPr lang="fr-FR" dirty="0" err="1" smtClean="0"/>
+              <a:t>WebServices</a:t>
+            </a:r>
             <a:endParaRPr lang="fr-FR" dirty="0"/>
           </a:p>
           <a:p>
-            <a:r>
-              <a:rPr lang="fr-FR" dirty="0" smtClean="0"/>
-              <a:t>On a envie de l’utiliser.</a:t>
+            <a:endParaRPr lang="fr-FR" dirty="0" smtClean="0"/>
+          </a:p>
+          <a:p>
+            <a:r>
+              <a:rPr lang="fr-FR" dirty="0" smtClean="0"/>
+              <a:t>Pas facilement </a:t>
+            </a:r>
+            <a:r>
+              <a:rPr lang="fr-FR" dirty="0" err="1" smtClean="0"/>
+              <a:t>Etendable</a:t>
+            </a:r>
+            <a:r>
+              <a:rPr lang="fr-FR" dirty="0" smtClean="0"/>
+              <a:t> (hormis à partir d’un fichier proto)</a:t>
             </a:r>
             <a:endParaRPr lang="fr-FR" dirty="0"/>
           </a:p>
@@ -3647,7 +3627,7 @@
     </p:spTree>
     <p:extLst>
       <p:ext uri="{BB962C8B-B14F-4D97-AF65-F5344CB8AC3E}">
-        <p14:creationId xmlns:p14="http://schemas.microsoft.com/office/powerpoint/2010/main" val="4064413871"/>
+        <p14:creationId xmlns:p14="http://schemas.microsoft.com/office/powerpoint/2010/main" val="4117981998"/>
       </p:ext>
     </p:extLst>
   </p:cSld>
@@ -3691,7 +3671,7 @@
           <a:p>
             <a:r>
               <a:rPr lang="fr-FR" dirty="0" smtClean="0"/>
-              <a:t>Notre cas de figure</a:t>
+              <a:t>Et Maintenant ?</a:t>
             </a:r>
             <a:endParaRPr lang="fr-FR" dirty="0"/>
           </a:p>
@@ -3709,50 +3689,35 @@
         </p:nvSpPr>
         <p:spPr/>
         <p:txBody>
-          <a:bodyPr/>
-          <a:lstStyle/>
-          <a:p>
-            <a:r>
-              <a:rPr lang="fr-FR" dirty="0" smtClean="0"/>
-              <a:t>On veut faire une application :</a:t>
-            </a:r>
-          </a:p>
-          <a:p>
-            <a:pPr lvl="1"/>
-            <a:r>
-              <a:rPr lang="fr-FR" dirty="0" smtClean="0"/>
-              <a:t>Liste les issues </a:t>
-            </a:r>
-            <a:r>
-              <a:rPr lang="fr-FR" dirty="0" err="1" smtClean="0"/>
-              <a:t>github</a:t>
-            </a:r>
-            <a:r>
-              <a:rPr lang="fr-FR" dirty="0" smtClean="0"/>
-              <a:t> pour </a:t>
+          <a:bodyPr>
+            <a:normAutofit lnSpcReduction="10000"/>
+          </a:bodyPr>
+          <a:lstStyle/>
+          <a:p>
+            <a:r>
+              <a:rPr lang="fr-FR" dirty="0" smtClean="0"/>
+              <a:t>On aime </a:t>
             </a:r>
             <a:r>
               <a:rPr lang="fr-FR" dirty="0" err="1" smtClean="0"/>
               <a:t>protobuf</a:t>
             </a:r>
-            <a:endParaRPr lang="fr-FR" dirty="0" smtClean="0"/>
-          </a:p>
-          <a:p>
-            <a:pPr lvl="1"/>
-            <a:r>
-              <a:rPr lang="fr-FR" dirty="0" smtClean="0"/>
-              <a:t>En lecture seulement</a:t>
-            </a:r>
+            <a:r>
+              <a:rPr lang="fr-FR" dirty="0"/>
+              <a:t> </a:t>
+            </a:r>
+            <a:r>
+              <a:rPr lang="fr-FR" dirty="0" smtClean="0"/>
+              <a:t>pour ses avantages</a:t>
+            </a:r>
+          </a:p>
+          <a:p>
             <a:endParaRPr lang="fr-FR" dirty="0"/>
           </a:p>
           <a:p>
-            <a:pPr lvl="1"/>
-            <a:endParaRPr lang="fr-FR" dirty="0" smtClean="0"/>
-          </a:p>
-          <a:p>
-            <a:r>
-              <a:rPr lang="fr-FR" dirty="0" smtClean="0"/>
-              <a:t>Avec du cache local</a:t>
+            <a:r>
+              <a:rPr lang="fr-FR" dirty="0" smtClean="0"/>
+              <a:t>On l’aime moins pour ses inconvénients</a:t>
             </a:r>
           </a:p>
           <a:p>
@@ -3761,15 +3726,29 @@
           <a:p>
             <a:r>
               <a:rPr lang="fr-FR" dirty="0" smtClean="0"/>
-              <a:t>Paramétrable (nombre d’issue, délai de cache)</a:t>
-            </a:r>
+              <a:t>On a envie de l’utiliser</a:t>
+            </a:r>
+            <a:r>
+              <a:rPr lang="fr-FR" dirty="0" smtClean="0"/>
+              <a:t>.</a:t>
+            </a:r>
+          </a:p>
+          <a:p>
+            <a:endParaRPr lang="fr-FR" dirty="0"/>
+          </a:p>
+          <a:p>
+            <a:r>
+              <a:rPr lang="fr-FR" dirty="0" smtClean="0"/>
+              <a:t>On n’a pas le temps d’apprendre beaucoup de nouvelles technos.</a:t>
+            </a:r>
+            <a:endParaRPr lang="fr-FR" dirty="0"/>
           </a:p>
         </p:txBody>
       </p:sp>
     </p:spTree>
     <p:extLst>
       <p:ext uri="{BB962C8B-B14F-4D97-AF65-F5344CB8AC3E}">
-        <p14:creationId xmlns:p14="http://schemas.microsoft.com/office/powerpoint/2010/main" val="3172752415"/>
+        <p14:creationId xmlns:p14="http://schemas.microsoft.com/office/powerpoint/2010/main" val="4064413871"/>
       </p:ext>
     </p:extLst>
   </p:cSld>
@@ -3812,84 +3791,90 @@
           <a:lstStyle/>
           <a:p>
             <a:r>
+              <a:rPr lang="fr-FR" dirty="0" smtClean="0"/>
+              <a:t>Notre cas de figure</a:t>
+            </a:r>
+            <a:endParaRPr lang="fr-FR" dirty="0"/>
+          </a:p>
+        </p:txBody>
+      </p:sp>
+      <p:sp>
+        <p:nvSpPr>
+          <p:cNvPr id="3" name="Espace réservé du contenu 2"/>
+          <p:cNvSpPr>
+            <a:spLocks noGrp="1"/>
+          </p:cNvSpPr>
+          <p:nvPr>
+            <p:ph idx="1"/>
+          </p:nvPr>
+        </p:nvSpPr>
+        <p:spPr/>
+        <p:txBody>
+          <a:bodyPr/>
+          <a:lstStyle/>
+          <a:p>
+            <a:r>
+              <a:rPr lang="fr-FR" dirty="0" smtClean="0"/>
+              <a:t>On veut faire une application :</a:t>
+            </a:r>
+          </a:p>
+          <a:p>
+            <a:pPr lvl="1"/>
+            <a:r>
+              <a:rPr lang="fr-FR" dirty="0" smtClean="0"/>
+              <a:t>Liste les issues </a:t>
+            </a:r>
+            <a:r>
               <a:rPr lang="fr-FR" dirty="0" err="1" smtClean="0"/>
-              <a:t>Conlusion</a:t>
-            </a:r>
-            <a:r>
-              <a:rPr lang="fr-FR" dirty="0" smtClean="0"/>
-              <a:t> : La panacée ?</a:t>
+              <a:t>github</a:t>
+            </a:r>
+            <a:r>
+              <a:rPr lang="fr-FR" dirty="0" smtClean="0"/>
+              <a:t> pour </a:t>
+            </a:r>
+            <a:r>
+              <a:rPr lang="fr-FR" dirty="0" err="1" smtClean="0"/>
+              <a:t>protobuf</a:t>
+            </a:r>
+            <a:endParaRPr lang="fr-FR" dirty="0" smtClean="0"/>
+          </a:p>
+          <a:p>
+            <a:pPr lvl="1"/>
+            <a:r>
+              <a:rPr lang="fr-FR" dirty="0" smtClean="0"/>
+              <a:t>En </a:t>
+            </a:r>
+            <a:r>
+              <a:rPr lang="fr-FR" dirty="0" smtClean="0"/>
+              <a:t>consultation seulement</a:t>
             </a:r>
             <a:endParaRPr lang="fr-FR" dirty="0"/>
           </a:p>
-        </p:txBody>
-      </p:sp>
-      <p:sp>
-        <p:nvSpPr>
-          <p:cNvPr id="3" name="Espace réservé du contenu 2"/>
-          <p:cNvSpPr>
-            <a:spLocks noGrp="1"/>
-          </p:cNvSpPr>
-          <p:nvPr>
-            <p:ph idx="1"/>
-          </p:nvPr>
-        </p:nvSpPr>
-        <p:spPr/>
-        <p:txBody>
-          <a:bodyPr/>
-          <a:lstStyle/>
-          <a:p>
-            <a:r>
-              <a:rPr lang="fr-FR" dirty="0" smtClean="0"/>
-              <a:t>On tape correctement notre </a:t>
-            </a:r>
-            <a:r>
-              <a:rPr lang="fr-FR" dirty="0" err="1" smtClean="0"/>
-              <a:t>webservice</a:t>
-            </a:r>
+          <a:p>
+            <a:pPr lvl="1"/>
             <a:endParaRPr lang="fr-FR" dirty="0" smtClean="0"/>
           </a:p>
           <a:p>
+            <a:r>
+              <a:rPr lang="fr-FR" dirty="0" smtClean="0"/>
+              <a:t>Avec du cache local</a:t>
+            </a:r>
+          </a:p>
+          <a:p>
             <a:endParaRPr lang="fr-FR" dirty="0"/>
           </a:p>
           <a:p>
             <a:r>
               <a:rPr lang="fr-FR" dirty="0" smtClean="0"/>
-              <a:t>On a notre </a:t>
-            </a:r>
-            <a:r>
-              <a:rPr lang="fr-FR" dirty="0" err="1" smtClean="0"/>
-              <a:t>storage</a:t>
-            </a:r>
-            <a:r>
-              <a:rPr lang="fr-FR" dirty="0" smtClean="0"/>
-              <a:t> local relativement simple</a:t>
-            </a:r>
-          </a:p>
-          <a:p>
-            <a:endParaRPr lang="fr-FR" dirty="0"/>
-          </a:p>
-          <a:p>
-            <a:r>
-              <a:rPr lang="fr-FR" dirty="0" smtClean="0"/>
-              <a:t>On a une application télé-paramétrable </a:t>
-            </a:r>
-          </a:p>
-          <a:p>
-            <a:endParaRPr lang="fr-FR" dirty="0"/>
-          </a:p>
-          <a:p>
-            <a:r>
-              <a:rPr lang="fr-FR" dirty="0" smtClean="0"/>
-              <a:t>MAIS : on n’a pas fait d’édition locale.</a:t>
-            </a:r>
-            <a:endParaRPr lang="fr-FR" dirty="0"/>
+              <a:t>Paramétrable (nombre d’issue, délai de cache)</a:t>
+            </a:r>
           </a:p>
         </p:txBody>
       </p:sp>
     </p:spTree>
     <p:extLst>
       <p:ext uri="{BB962C8B-B14F-4D97-AF65-F5344CB8AC3E}">
-        <p14:creationId xmlns:p14="http://schemas.microsoft.com/office/powerpoint/2010/main" val="3950536386"/>
+        <p14:creationId xmlns:p14="http://schemas.microsoft.com/office/powerpoint/2010/main" val="3172752415"/>
       </p:ext>
     </p:extLst>
   </p:cSld>
@@ -3933,7 +3918,7 @@
           <a:p>
             <a:r>
               <a:rPr lang="fr-FR" dirty="0" smtClean="0"/>
-              <a:t>Conclusion Bis</a:t>
+              <a:t>Appels REST</a:t>
             </a:r>
             <a:endParaRPr lang="fr-FR" dirty="0"/>
           </a:p>
@@ -3956,42 +3941,801 @@
           <a:p>
             <a:r>
               <a:rPr lang="fr-FR" dirty="0" smtClean="0"/>
-              <a:t>Mécanique applicable à n’importe quel outil/librairie</a:t>
-            </a:r>
-          </a:p>
-          <a:p>
+              <a:t>API </a:t>
+            </a:r>
+            <a:r>
+              <a:rPr lang="fr-FR" dirty="0" err="1" smtClean="0"/>
+              <a:t>Github</a:t>
+            </a:r>
+            <a:r>
+              <a:rPr lang="fr-FR" dirty="0" smtClean="0"/>
+              <a:t> </a:t>
+            </a:r>
+            <a:r>
+              <a:rPr lang="fr-FR" dirty="0" err="1" smtClean="0"/>
+              <a:t>RESTful</a:t>
+            </a:r>
             <a:endParaRPr lang="fr-FR" dirty="0" smtClean="0"/>
           </a:p>
           <a:p>
-            <a:r>
-              <a:rPr lang="fr-FR" dirty="0" smtClean="0"/>
-              <a:t>Faire l’inventaire des avantages et inconvénients</a:t>
-            </a:r>
             <a:endParaRPr lang="fr-FR" dirty="0"/>
           </a:p>
           <a:p>
+            <a:r>
+              <a:rPr lang="fr-FR" dirty="0" smtClean="0"/>
+              <a:t>Retourne du JSON</a:t>
+            </a:r>
+          </a:p>
+          <a:p>
             <a:endParaRPr lang="fr-FR" dirty="0"/>
           </a:p>
           <a:p>
             <a:r>
               <a:rPr lang="fr-FR" dirty="0" smtClean="0"/>
-              <a:t>Exemple : </a:t>
+              <a:t>Les issues d’un </a:t>
+            </a:r>
+            <a:r>
+              <a:rPr lang="fr-FR" dirty="0" err="1" smtClean="0"/>
+              <a:t>repository</a:t>
+            </a:r>
+            <a:r>
+              <a:rPr lang="fr-FR" dirty="0" smtClean="0"/>
+              <a:t>  :</a:t>
             </a:r>
           </a:p>
           <a:p>
             <a:pPr lvl="1"/>
             <a:r>
               <a:rPr lang="fr-FR" dirty="0" smtClean="0"/>
-              <a:t>Bus de communication via chat IRC.</a:t>
-            </a:r>
-            <a:endParaRPr lang="fr-FR" dirty="0"/>
+              <a:t>GET /repos/:</a:t>
+            </a:r>
+            <a:r>
+              <a:rPr lang="fr-FR" dirty="0" err="1" smtClean="0"/>
+              <a:t>owner</a:t>
+            </a:r>
+            <a:r>
+              <a:rPr lang="fr-FR" dirty="0" smtClean="0"/>
+              <a:t>/:repo/issues</a:t>
+            </a:r>
           </a:p>
         </p:txBody>
       </p:sp>
     </p:spTree>
     <p:extLst>
       <p:ext uri="{BB962C8B-B14F-4D97-AF65-F5344CB8AC3E}">
-        <p14:creationId xmlns:p14="http://schemas.microsoft.com/office/powerpoint/2010/main" val="1318296312"/>
+        <p14:creationId xmlns:p14="http://schemas.microsoft.com/office/powerpoint/2010/main" val="4073601911"/>
+      </p:ext>
+    </p:extLst>
+  </p:cSld>
+  <p:clrMapOvr>
+    <a:masterClrMapping/>
+  </p:clrMapOvr>
+</p:sld>
+</file>
+
+<file path=ppt/slides/slide17.xml><?xml version="1.0" encoding="utf-8"?>
+<p:sld xmlns:a="http://schemas.openxmlformats.org/drawingml/2006/main" xmlns:r="http://schemas.openxmlformats.org/officeDocument/2006/relationships" xmlns:p="http://schemas.openxmlformats.org/presentationml/2006/main">
+  <p:cSld>
+    <p:spTree>
+      <p:nvGrpSpPr>
+        <p:cNvPr id="1" name=""/>
+        <p:cNvGrpSpPr/>
+        <p:nvPr/>
+      </p:nvGrpSpPr>
+      <p:grpSpPr>
+        <a:xfrm>
+          <a:off x="0" y="0"/>
+          <a:ext cx="0" cy="0"/>
+          <a:chOff x="0" y="0"/>
+          <a:chExt cx="0" cy="0"/>
+        </a:xfrm>
+      </p:grpSpPr>
+      <p:sp>
+        <p:nvSpPr>
+          <p:cNvPr id="2" name="Titre 1"/>
+          <p:cNvSpPr>
+            <a:spLocks noGrp="1"/>
+          </p:cNvSpPr>
+          <p:nvPr>
+            <p:ph type="title"/>
+          </p:nvPr>
+        </p:nvSpPr>
+        <p:spPr/>
+        <p:txBody>
+          <a:bodyPr/>
+          <a:lstStyle/>
+          <a:p>
+            <a:r>
+              <a:rPr lang="fr-FR" dirty="0" smtClean="0"/>
+              <a:t>Issue</a:t>
+            </a:r>
+            <a:endParaRPr lang="fr-FR" dirty="0"/>
+          </a:p>
+        </p:txBody>
+      </p:sp>
+      <p:sp>
+        <p:nvSpPr>
+          <p:cNvPr id="3" name="Espace réservé du contenu 2"/>
+          <p:cNvSpPr>
+            <a:spLocks noGrp="1"/>
+          </p:cNvSpPr>
+          <p:nvPr>
+            <p:ph idx="1"/>
+          </p:nvPr>
+        </p:nvSpPr>
+        <p:spPr/>
+        <p:txBody>
+          <a:bodyPr>
+            <a:normAutofit fontScale="70000" lnSpcReduction="20000"/>
+          </a:bodyPr>
+          <a:lstStyle/>
+          <a:p>
+            <a:r>
+              <a:rPr lang="fr-FR" dirty="0" smtClean="0"/>
+              <a:t>Créons un objet </a:t>
+            </a:r>
+            <a:r>
+              <a:rPr lang="fr-FR" dirty="0" err="1"/>
+              <a:t>P</a:t>
+            </a:r>
+            <a:r>
+              <a:rPr lang="fr-FR" dirty="0" err="1" smtClean="0"/>
+              <a:t>rotobuf</a:t>
+            </a:r>
+            <a:r>
+              <a:rPr lang="fr-FR" dirty="0" smtClean="0"/>
+              <a:t> basique</a:t>
+            </a:r>
+          </a:p>
+          <a:p>
+            <a:endParaRPr lang="fr-FR" dirty="0" smtClean="0"/>
+          </a:p>
+          <a:p>
+            <a:pPr marL="0" indent="0">
+              <a:buNone/>
+            </a:pPr>
+            <a:r>
+              <a:rPr lang="fr-FR" b="1" dirty="0">
+                <a:solidFill>
+                  <a:srgbClr val="000080"/>
+                </a:solidFill>
+              </a:rPr>
+              <a:t>message </a:t>
+            </a:r>
+            <a:r>
+              <a:rPr lang="fr-FR" dirty="0"/>
+              <a:t>Issue {</a:t>
+            </a:r>
+            <a:br>
+              <a:rPr lang="fr-FR" dirty="0"/>
+            </a:br>
+            <a:r>
+              <a:rPr lang="fr-FR" dirty="0"/>
+              <a:t>   </a:t>
+            </a:r>
+            <a:r>
+              <a:rPr lang="fr-FR" b="1" dirty="0" err="1">
+                <a:solidFill>
+                  <a:srgbClr val="000080"/>
+                </a:solidFill>
+              </a:rPr>
+              <a:t>required</a:t>
+            </a:r>
+            <a:r>
+              <a:rPr lang="fr-FR" b="1" dirty="0">
+                <a:solidFill>
+                  <a:srgbClr val="000080"/>
+                </a:solidFill>
+              </a:rPr>
+              <a:t> string </a:t>
+            </a:r>
+            <a:r>
+              <a:rPr lang="fr-FR" dirty="0"/>
+              <a:t>id = </a:t>
+            </a:r>
+            <a:r>
+              <a:rPr lang="fr-FR" dirty="0">
+                <a:solidFill>
+                  <a:srgbClr val="0000FF"/>
+                </a:solidFill>
+              </a:rPr>
+              <a:t>1</a:t>
+            </a:r>
+            <a:r>
+              <a:rPr lang="fr-FR" dirty="0"/>
+              <a:t>;</a:t>
+            </a:r>
+            <a:br>
+              <a:rPr lang="fr-FR" dirty="0"/>
+            </a:br>
+            <a:r>
+              <a:rPr lang="fr-FR" dirty="0"/>
+              <a:t>   </a:t>
+            </a:r>
+            <a:r>
+              <a:rPr lang="fr-FR" b="1" dirty="0" err="1">
+                <a:solidFill>
+                  <a:srgbClr val="000080"/>
+                </a:solidFill>
+              </a:rPr>
+              <a:t>required</a:t>
+            </a:r>
+            <a:r>
+              <a:rPr lang="fr-FR" b="1" dirty="0">
+                <a:solidFill>
+                  <a:srgbClr val="000080"/>
+                </a:solidFill>
+              </a:rPr>
+              <a:t> int32 </a:t>
+            </a:r>
+            <a:r>
+              <a:rPr lang="fr-FR" dirty="0" err="1"/>
+              <a:t>number</a:t>
+            </a:r>
+            <a:r>
+              <a:rPr lang="fr-FR" dirty="0"/>
+              <a:t> = </a:t>
+            </a:r>
+            <a:r>
+              <a:rPr lang="fr-FR" dirty="0">
+                <a:solidFill>
+                  <a:srgbClr val="0000FF"/>
+                </a:solidFill>
+              </a:rPr>
+              <a:t>2</a:t>
+            </a:r>
+            <a:r>
+              <a:rPr lang="fr-FR" dirty="0"/>
+              <a:t>;</a:t>
+            </a:r>
+            <a:br>
+              <a:rPr lang="fr-FR" dirty="0"/>
+            </a:br>
+            <a:r>
+              <a:rPr lang="fr-FR" dirty="0"/>
+              <a:t>   </a:t>
+            </a:r>
+            <a:r>
+              <a:rPr lang="fr-FR" b="1" dirty="0" err="1">
+                <a:solidFill>
+                  <a:srgbClr val="000080"/>
+                </a:solidFill>
+              </a:rPr>
+              <a:t>optional</a:t>
+            </a:r>
+            <a:r>
+              <a:rPr lang="fr-FR" b="1" dirty="0">
+                <a:solidFill>
+                  <a:srgbClr val="000080"/>
+                </a:solidFill>
+              </a:rPr>
+              <a:t> string </a:t>
+            </a:r>
+            <a:r>
+              <a:rPr lang="fr-FR" dirty="0" err="1"/>
+              <a:t>title</a:t>
+            </a:r>
+            <a:r>
+              <a:rPr lang="fr-FR" dirty="0"/>
+              <a:t> = </a:t>
+            </a:r>
+            <a:r>
+              <a:rPr lang="fr-FR" dirty="0">
+                <a:solidFill>
+                  <a:srgbClr val="0000FF"/>
+                </a:solidFill>
+              </a:rPr>
+              <a:t>3</a:t>
+            </a:r>
+            <a:r>
+              <a:rPr lang="fr-FR" dirty="0"/>
+              <a:t>;</a:t>
+            </a:r>
+            <a:br>
+              <a:rPr lang="fr-FR" dirty="0"/>
+            </a:br>
+            <a:r>
+              <a:rPr lang="fr-FR" dirty="0"/>
+              <a:t>   </a:t>
+            </a:r>
+            <a:r>
+              <a:rPr lang="fr-FR" b="1" dirty="0" err="1">
+                <a:solidFill>
+                  <a:srgbClr val="000080"/>
+                </a:solidFill>
+              </a:rPr>
+              <a:t>optional</a:t>
+            </a:r>
+            <a:r>
+              <a:rPr lang="fr-FR" b="1" dirty="0">
+                <a:solidFill>
+                  <a:srgbClr val="000080"/>
+                </a:solidFill>
+              </a:rPr>
+              <a:t> string </a:t>
+            </a:r>
+            <a:r>
+              <a:rPr lang="fr-FR" dirty="0"/>
+              <a:t>state = </a:t>
+            </a:r>
+            <a:r>
+              <a:rPr lang="fr-FR" dirty="0">
+                <a:solidFill>
+                  <a:srgbClr val="0000FF"/>
+                </a:solidFill>
+              </a:rPr>
+              <a:t>4</a:t>
+            </a:r>
+            <a:r>
+              <a:rPr lang="fr-FR" dirty="0"/>
+              <a:t>;</a:t>
+            </a:r>
+            <a:br>
+              <a:rPr lang="fr-FR" dirty="0"/>
+            </a:br>
+            <a:r>
+              <a:rPr lang="fr-FR" dirty="0"/>
+              <a:t>   </a:t>
+            </a:r>
+            <a:r>
+              <a:rPr lang="fr-FR" b="1" dirty="0" err="1">
+                <a:solidFill>
+                  <a:srgbClr val="000080"/>
+                </a:solidFill>
+              </a:rPr>
+              <a:t>optional</a:t>
+            </a:r>
+            <a:r>
+              <a:rPr lang="fr-FR" b="1" dirty="0">
+                <a:solidFill>
+                  <a:srgbClr val="000080"/>
+                </a:solidFill>
+              </a:rPr>
+              <a:t> string </a:t>
+            </a:r>
+            <a:r>
+              <a:rPr lang="fr-FR" dirty="0"/>
+              <a:t>body = </a:t>
+            </a:r>
+            <a:r>
+              <a:rPr lang="fr-FR" dirty="0">
+                <a:solidFill>
+                  <a:srgbClr val="0000FF"/>
+                </a:solidFill>
+              </a:rPr>
+              <a:t>5</a:t>
+            </a:r>
+            <a:r>
+              <a:rPr lang="fr-FR" dirty="0"/>
+              <a:t>;</a:t>
+            </a:r>
+            <a:br>
+              <a:rPr lang="fr-FR" dirty="0"/>
+            </a:br>
+            <a:r>
+              <a:rPr lang="fr-FR" dirty="0"/>
+              <a:t/>
+            </a:r>
+            <a:br>
+              <a:rPr lang="fr-FR" dirty="0"/>
+            </a:br>
+            <a:r>
+              <a:rPr lang="fr-FR" dirty="0" smtClean="0"/>
+              <a:t>}</a:t>
+            </a:r>
+          </a:p>
+          <a:p>
+            <a:endParaRPr lang="fr-FR" dirty="0">
+              <a:solidFill>
+                <a:srgbClr val="000000"/>
+              </a:solidFill>
+              <a:latin typeface="Helvetica"/>
+              <a:ea typeface="Helvetica"/>
+              <a:cs typeface="Helvetica"/>
+            </a:endParaRPr>
+          </a:p>
+          <a:p>
+            <a:pPr marL="0" indent="0">
+              <a:buNone/>
+            </a:pPr>
+            <a:r>
+              <a:rPr lang="fr-FR" b="1" dirty="0">
+                <a:solidFill>
+                  <a:srgbClr val="011893"/>
+                </a:solidFill>
+                <a:ea typeface="Menlo"/>
+                <a:cs typeface="Menlo"/>
+              </a:rPr>
+              <a:t>message </a:t>
+            </a:r>
+            <a:r>
+              <a:rPr lang="fr-FR" dirty="0">
+                <a:solidFill>
+                  <a:srgbClr val="000000"/>
+                </a:solidFill>
+                <a:ea typeface="Menlo"/>
+                <a:cs typeface="Menlo"/>
+              </a:rPr>
+              <a:t>Issues {</a:t>
+            </a:r>
+          </a:p>
+          <a:p>
+            <a:pPr marL="0" indent="0">
+              <a:buNone/>
+            </a:pPr>
+            <a:r>
+              <a:rPr lang="fr-FR" dirty="0">
+                <a:solidFill>
+                  <a:srgbClr val="000000"/>
+                </a:solidFill>
+                <a:ea typeface="Menlo"/>
+                <a:cs typeface="Menlo"/>
+              </a:rPr>
+              <a:t>	</a:t>
+            </a:r>
+            <a:r>
+              <a:rPr lang="fr-FR" b="1" dirty="0" err="1">
+                <a:solidFill>
+                  <a:srgbClr val="011893"/>
+                </a:solidFill>
+                <a:ea typeface="Menlo"/>
+                <a:cs typeface="Menlo"/>
+              </a:rPr>
+              <a:t>repeated</a:t>
+            </a:r>
+            <a:r>
+              <a:rPr lang="fr-FR" b="1" dirty="0">
+                <a:solidFill>
+                  <a:srgbClr val="011893"/>
+                </a:solidFill>
+                <a:ea typeface="Menlo"/>
+                <a:cs typeface="Menlo"/>
+              </a:rPr>
+              <a:t> </a:t>
+            </a:r>
+            <a:r>
+              <a:rPr lang="fr-FR" dirty="0">
+                <a:solidFill>
+                  <a:srgbClr val="000000"/>
+                </a:solidFill>
+                <a:ea typeface="Menlo"/>
+                <a:cs typeface="Menlo"/>
+              </a:rPr>
+              <a:t>Issue issues = </a:t>
+            </a:r>
+            <a:r>
+              <a:rPr lang="fr-FR" dirty="0">
+                <a:solidFill>
+                  <a:srgbClr val="0432FF"/>
+                </a:solidFill>
+                <a:ea typeface="Menlo"/>
+                <a:cs typeface="Menlo"/>
+              </a:rPr>
+              <a:t>1</a:t>
+            </a:r>
+            <a:r>
+              <a:rPr lang="fr-FR" dirty="0">
+                <a:solidFill>
+                  <a:srgbClr val="000000"/>
+                </a:solidFill>
+                <a:ea typeface="Menlo"/>
+                <a:cs typeface="Menlo"/>
+              </a:rPr>
+              <a:t>;</a:t>
+            </a:r>
+          </a:p>
+          <a:p>
+            <a:pPr marL="0" indent="0">
+              <a:buNone/>
+            </a:pPr>
+            <a:r>
+              <a:rPr lang="fr-FR" dirty="0">
+                <a:solidFill>
+                  <a:srgbClr val="000000"/>
+                </a:solidFill>
+                <a:ea typeface="Menlo"/>
+                <a:cs typeface="Menlo"/>
+              </a:rPr>
+              <a:t>}</a:t>
+            </a:r>
+            <a:endParaRPr lang="fr-FR" dirty="0" smtClean="0"/>
+          </a:p>
+          <a:p>
+            <a:pPr marL="0" indent="0">
+              <a:buNone/>
+            </a:pPr>
+            <a:endParaRPr lang="fr-FR" dirty="0"/>
+          </a:p>
+          <a:p>
+            <a:endParaRPr lang="fr-FR" dirty="0"/>
+          </a:p>
+        </p:txBody>
+      </p:sp>
+    </p:spTree>
+    <p:extLst>
+      <p:ext uri="{BB962C8B-B14F-4D97-AF65-F5344CB8AC3E}">
+        <p14:creationId xmlns:p14="http://schemas.microsoft.com/office/powerpoint/2010/main" val="2450042435"/>
+      </p:ext>
+    </p:extLst>
+  </p:cSld>
+  <p:clrMapOvr>
+    <a:masterClrMapping/>
+  </p:clrMapOvr>
+</p:sld>
+</file>
+
+<file path=ppt/slides/slide18.xml><?xml version="1.0" encoding="utf-8"?>
+<p:sld xmlns:a="http://schemas.openxmlformats.org/drawingml/2006/main" xmlns:r="http://schemas.openxmlformats.org/officeDocument/2006/relationships" xmlns:p="http://schemas.openxmlformats.org/presentationml/2006/main">
+  <p:cSld>
+    <p:spTree>
+      <p:nvGrpSpPr>
+        <p:cNvPr id="1" name=""/>
+        <p:cNvGrpSpPr/>
+        <p:nvPr/>
+      </p:nvGrpSpPr>
+      <p:grpSpPr>
+        <a:xfrm>
+          <a:off x="0" y="0"/>
+          <a:ext cx="0" cy="0"/>
+          <a:chOff x="0" y="0"/>
+          <a:chExt cx="0" cy="0"/>
+        </a:xfrm>
+      </p:grpSpPr>
+      <p:sp>
+        <p:nvSpPr>
+          <p:cNvPr id="2" name="Titre 1"/>
+          <p:cNvSpPr>
+            <a:spLocks noGrp="1"/>
+          </p:cNvSpPr>
+          <p:nvPr>
+            <p:ph type="title"/>
+          </p:nvPr>
+        </p:nvSpPr>
+        <p:spPr/>
+        <p:txBody>
+          <a:bodyPr/>
+          <a:lstStyle/>
+          <a:p>
+            <a:r>
+              <a:rPr lang="fr-FR" dirty="0" smtClean="0"/>
+              <a:t>Et donc ?</a:t>
+            </a:r>
+            <a:endParaRPr lang="fr-FR" dirty="0"/>
+          </a:p>
+        </p:txBody>
+      </p:sp>
+      <p:sp>
+        <p:nvSpPr>
+          <p:cNvPr id="3" name="Espace réservé du contenu 2"/>
+          <p:cNvSpPr>
+            <a:spLocks noGrp="1"/>
+          </p:cNvSpPr>
+          <p:nvPr>
+            <p:ph idx="1"/>
+          </p:nvPr>
+        </p:nvSpPr>
+        <p:spPr/>
+        <p:txBody>
+          <a:bodyPr/>
+          <a:lstStyle/>
+          <a:p>
+            <a:r>
+              <a:rPr lang="fr-FR" dirty="0" smtClean="0"/>
+              <a:t>Le plus : </a:t>
+            </a:r>
+          </a:p>
+          <a:p>
+            <a:pPr lvl="1"/>
+            <a:r>
+              <a:rPr lang="fr-FR" dirty="0" smtClean="0"/>
+              <a:t>Modèle </a:t>
+            </a:r>
+            <a:r>
+              <a:rPr lang="fr-FR" dirty="0" err="1" smtClean="0"/>
+              <a:t>Protobuf</a:t>
+            </a:r>
+            <a:endParaRPr lang="fr-FR" dirty="0" smtClean="0"/>
+          </a:p>
+          <a:p>
+            <a:pPr lvl="1"/>
+            <a:r>
+              <a:rPr lang="fr-FR" dirty="0" smtClean="0"/>
+              <a:t>Objets générés (+ </a:t>
+            </a:r>
+            <a:r>
+              <a:rPr lang="fr-FR" dirty="0" err="1" smtClean="0"/>
+              <a:t>builder</a:t>
+            </a:r>
+            <a:r>
+              <a:rPr lang="fr-FR" dirty="0" smtClean="0"/>
+              <a:t> + </a:t>
+            </a:r>
+            <a:r>
+              <a:rPr lang="fr-FR" dirty="0" err="1" smtClean="0"/>
+              <a:t>toString</a:t>
+            </a:r>
+            <a:r>
+              <a:rPr lang="fr-FR" dirty="0" smtClean="0"/>
+              <a:t>, etc.)</a:t>
+            </a:r>
+          </a:p>
+          <a:p>
+            <a:endParaRPr lang="fr-FR" dirty="0"/>
+          </a:p>
+          <a:p>
+            <a:r>
+              <a:rPr lang="fr-FR" dirty="0" smtClean="0"/>
+              <a:t>Mais on ne peut pas consommer le </a:t>
+            </a:r>
+            <a:r>
+              <a:rPr lang="fr-FR" dirty="0" err="1" smtClean="0"/>
+              <a:t>WebService</a:t>
+            </a:r>
+            <a:endParaRPr lang="fr-FR" dirty="0" smtClean="0"/>
+          </a:p>
+          <a:p>
+            <a:endParaRPr lang="fr-FR" dirty="0"/>
+          </a:p>
+          <a:p>
+            <a:r>
+              <a:rPr lang="fr-FR" dirty="0" smtClean="0"/>
+              <a:t>Le </a:t>
+            </a:r>
+            <a:r>
+              <a:rPr lang="fr-FR" dirty="0" err="1" smtClean="0"/>
+              <a:t>WebService</a:t>
+            </a:r>
+            <a:r>
+              <a:rPr lang="fr-FR" dirty="0" smtClean="0"/>
+              <a:t> produit du </a:t>
+            </a:r>
+            <a:r>
+              <a:rPr lang="fr-FR" dirty="0" err="1" smtClean="0"/>
+              <a:t>json</a:t>
+            </a:r>
+            <a:r>
+              <a:rPr lang="is-IS" dirty="0" smtClean="0"/>
+              <a:t>…</a:t>
+            </a:r>
+            <a:endParaRPr lang="fr-FR" dirty="0"/>
+          </a:p>
+        </p:txBody>
+      </p:sp>
+    </p:spTree>
+    <p:extLst>
+      <p:ext uri="{BB962C8B-B14F-4D97-AF65-F5344CB8AC3E}">
+        <p14:creationId xmlns:p14="http://schemas.microsoft.com/office/powerpoint/2010/main" val="678657226"/>
+      </p:ext>
+    </p:extLst>
+  </p:cSld>
+  <p:clrMapOvr>
+    <a:masterClrMapping/>
+  </p:clrMapOvr>
+</p:sld>
+</file>
+
+<file path=ppt/slides/slide19.xml><?xml version="1.0" encoding="utf-8"?>
+<p:sld xmlns:a="http://schemas.openxmlformats.org/drawingml/2006/main" xmlns:r="http://schemas.openxmlformats.org/officeDocument/2006/relationships" xmlns:p="http://schemas.openxmlformats.org/presentationml/2006/main">
+  <p:cSld>
+    <p:spTree>
+      <p:nvGrpSpPr>
+        <p:cNvPr id="1" name=""/>
+        <p:cNvGrpSpPr/>
+        <p:nvPr/>
+      </p:nvGrpSpPr>
+      <p:grpSpPr>
+        <a:xfrm>
+          <a:off x="0" y="0"/>
+          <a:ext cx="0" cy="0"/>
+          <a:chOff x="0" y="0"/>
+          <a:chExt cx="0" cy="0"/>
+        </a:xfrm>
+      </p:grpSpPr>
+      <p:sp>
+        <p:nvSpPr>
+          <p:cNvPr id="2" name="Titre 1"/>
+          <p:cNvSpPr>
+            <a:spLocks noGrp="1"/>
+          </p:cNvSpPr>
+          <p:nvPr>
+            <p:ph type="title"/>
+          </p:nvPr>
+        </p:nvSpPr>
+        <p:spPr/>
+        <p:txBody>
+          <a:bodyPr/>
+          <a:lstStyle/>
+          <a:p>
+            <a:r>
+              <a:rPr lang="fr-FR" dirty="0" smtClean="0"/>
+              <a:t>Pour consommer le REST</a:t>
+            </a:r>
+            <a:endParaRPr lang="fr-FR" dirty="0"/>
+          </a:p>
+        </p:txBody>
+      </p:sp>
+      <p:sp>
+        <p:nvSpPr>
+          <p:cNvPr id="3" name="Espace réservé du contenu 2"/>
+          <p:cNvSpPr>
+            <a:spLocks noGrp="1"/>
+          </p:cNvSpPr>
+          <p:nvPr>
+            <p:ph idx="1"/>
+          </p:nvPr>
+        </p:nvSpPr>
+        <p:spPr/>
+        <p:txBody>
+          <a:bodyPr/>
+          <a:lstStyle/>
+          <a:p>
+            <a:r>
+              <a:rPr lang="fr-FR" dirty="0" err="1" smtClean="0"/>
+              <a:t>Retrofit</a:t>
+            </a:r>
+            <a:r>
+              <a:rPr lang="fr-FR" dirty="0" smtClean="0"/>
+              <a:t> : </a:t>
+            </a:r>
+          </a:p>
+          <a:p>
+            <a:pPr lvl="1"/>
+            <a:r>
+              <a:rPr lang="fr-FR" dirty="0">
+                <a:hlinkClick r:id="rId2"/>
+              </a:rPr>
+              <a:t>http://square.github.io/retrofit</a:t>
+            </a:r>
+            <a:r>
+              <a:rPr lang="fr-FR" dirty="0" smtClean="0">
+                <a:hlinkClick r:id="rId2"/>
+              </a:rPr>
+              <a:t>/</a:t>
+            </a:r>
+            <a:endParaRPr lang="fr-FR" dirty="0" smtClean="0"/>
+          </a:p>
+          <a:p>
+            <a:pPr lvl="1"/>
+            <a:r>
+              <a:rPr lang="fr-FR" dirty="0" smtClean="0"/>
+              <a:t>Version 1.9.0</a:t>
+            </a:r>
+          </a:p>
+          <a:p>
+            <a:pPr lvl="1"/>
+            <a:r>
+              <a:rPr lang="fr-FR" dirty="0" smtClean="0"/>
+              <a:t>S’appuie sur </a:t>
+            </a:r>
+            <a:r>
+              <a:rPr lang="fr-FR" dirty="0" err="1" smtClean="0"/>
+              <a:t>okHttp</a:t>
+            </a:r>
+            <a:endParaRPr lang="fr-FR" dirty="0" smtClean="0"/>
+          </a:p>
+          <a:p>
+            <a:pPr lvl="1"/>
+            <a:endParaRPr lang="fr-FR" dirty="0"/>
+          </a:p>
+          <a:p>
+            <a:r>
+              <a:rPr lang="fr-FR" dirty="0" smtClean="0"/>
+              <a:t>Définition d’une interface avec des annotations. </a:t>
+            </a:r>
+          </a:p>
+          <a:p>
+            <a:r>
+              <a:rPr lang="fr-FR" dirty="0" smtClean="0"/>
+              <a:t>Utilisation d’objets java</a:t>
+            </a:r>
+            <a:endParaRPr lang="fr-FR" dirty="0"/>
+          </a:p>
+        </p:txBody>
+      </p:sp>
+    </p:spTree>
+    <p:extLst>
+      <p:ext uri="{BB962C8B-B14F-4D97-AF65-F5344CB8AC3E}">
+        <p14:creationId xmlns:p14="http://schemas.microsoft.com/office/powerpoint/2010/main" val="4259104201"/>
       </p:ext>
     </p:extLst>
   </p:cSld>
@@ -4073,6 +4817,2436 @@
 </p:sld>
 </file>
 
+<file path=ppt/slides/slide20.xml><?xml version="1.0" encoding="utf-8"?>
+<p:sld xmlns:a="http://schemas.openxmlformats.org/drawingml/2006/main" xmlns:r="http://schemas.openxmlformats.org/officeDocument/2006/relationships" xmlns:p="http://schemas.openxmlformats.org/presentationml/2006/main">
+  <p:cSld>
+    <p:spTree>
+      <p:nvGrpSpPr>
+        <p:cNvPr id="1" name=""/>
+        <p:cNvGrpSpPr/>
+        <p:nvPr/>
+      </p:nvGrpSpPr>
+      <p:grpSpPr>
+        <a:xfrm>
+          <a:off x="0" y="0"/>
+          <a:ext cx="0" cy="0"/>
+          <a:chOff x="0" y="0"/>
+          <a:chExt cx="0" cy="0"/>
+        </a:xfrm>
+      </p:grpSpPr>
+      <p:sp>
+        <p:nvSpPr>
+          <p:cNvPr id="2" name="Titre 1"/>
+          <p:cNvSpPr>
+            <a:spLocks noGrp="1"/>
+          </p:cNvSpPr>
+          <p:nvPr>
+            <p:ph type="title"/>
+          </p:nvPr>
+        </p:nvSpPr>
+        <p:spPr/>
+        <p:txBody>
+          <a:bodyPr/>
+          <a:lstStyle/>
+          <a:p>
+            <a:r>
+              <a:rPr lang="fr-FR" dirty="0" smtClean="0"/>
+              <a:t>Pourquoi </a:t>
+            </a:r>
+            <a:r>
+              <a:rPr lang="fr-FR" dirty="0" err="1" smtClean="0"/>
+              <a:t>Retrofit</a:t>
+            </a:r>
+            <a:endParaRPr lang="fr-FR" dirty="0"/>
+          </a:p>
+        </p:txBody>
+      </p:sp>
+      <p:sp>
+        <p:nvSpPr>
+          <p:cNvPr id="3" name="Espace réservé du contenu 2"/>
+          <p:cNvSpPr>
+            <a:spLocks noGrp="1"/>
+          </p:cNvSpPr>
+          <p:nvPr>
+            <p:ph idx="1"/>
+          </p:nvPr>
+        </p:nvSpPr>
+        <p:spPr/>
+        <p:txBody>
+          <a:bodyPr/>
+          <a:lstStyle/>
+          <a:p>
+            <a:r>
+              <a:rPr lang="fr-FR" dirty="0" smtClean="0"/>
+              <a:t>Simple</a:t>
+            </a:r>
+          </a:p>
+          <a:p>
+            <a:r>
+              <a:rPr lang="fr-FR" dirty="0" smtClean="0"/>
+              <a:t>Largement </a:t>
+            </a:r>
+            <a:r>
+              <a:rPr lang="fr-FR" dirty="0" err="1" smtClean="0"/>
+              <a:t>plébicité</a:t>
+            </a:r>
+            <a:r>
+              <a:rPr lang="fr-FR" dirty="0" smtClean="0"/>
+              <a:t> sur </a:t>
+            </a:r>
+            <a:r>
+              <a:rPr lang="fr-FR" dirty="0" err="1" smtClean="0"/>
+              <a:t>Android</a:t>
+            </a:r>
+            <a:endParaRPr lang="fr-FR" dirty="0" smtClean="0"/>
+          </a:p>
+          <a:p>
+            <a:endParaRPr lang="fr-FR" dirty="0"/>
+          </a:p>
+          <a:p>
+            <a:r>
+              <a:rPr lang="fr-FR" dirty="0" err="1" smtClean="0"/>
+              <a:t>Converters</a:t>
+            </a:r>
+            <a:r>
+              <a:rPr lang="fr-FR" dirty="0" smtClean="0"/>
+              <a:t> :</a:t>
+            </a:r>
+          </a:p>
+          <a:p>
+            <a:pPr lvl="1"/>
+            <a:r>
+              <a:rPr lang="fr-FR" dirty="0" smtClean="0"/>
+              <a:t>Classe permettant de convertir Objet &lt;-&gt; Format Sérialisé</a:t>
+            </a:r>
+          </a:p>
+          <a:p>
+            <a:pPr lvl="1"/>
+            <a:r>
+              <a:rPr lang="fr-FR" dirty="0" smtClean="0"/>
+              <a:t>Possibilité de créer ses </a:t>
+            </a:r>
+            <a:r>
+              <a:rPr lang="fr-FR" dirty="0" err="1" smtClean="0"/>
+              <a:t>converters</a:t>
+            </a:r>
+            <a:endParaRPr lang="fr-FR" dirty="0"/>
+          </a:p>
+        </p:txBody>
+      </p:sp>
+    </p:spTree>
+    <p:extLst>
+      <p:ext uri="{BB962C8B-B14F-4D97-AF65-F5344CB8AC3E}">
+        <p14:creationId xmlns:p14="http://schemas.microsoft.com/office/powerpoint/2010/main" val="887856882"/>
+      </p:ext>
+    </p:extLst>
+  </p:cSld>
+  <p:clrMapOvr>
+    <a:masterClrMapping/>
+  </p:clrMapOvr>
+</p:sld>
+</file>
+
+<file path=ppt/slides/slide21.xml><?xml version="1.0" encoding="utf-8"?>
+<p:sld xmlns:a="http://schemas.openxmlformats.org/drawingml/2006/main" xmlns:r="http://schemas.openxmlformats.org/officeDocument/2006/relationships" xmlns:p="http://schemas.openxmlformats.org/presentationml/2006/main">
+  <p:cSld>
+    <p:spTree>
+      <p:nvGrpSpPr>
+        <p:cNvPr id="1" name=""/>
+        <p:cNvGrpSpPr/>
+        <p:nvPr/>
+      </p:nvGrpSpPr>
+      <p:grpSpPr>
+        <a:xfrm>
+          <a:off x="0" y="0"/>
+          <a:ext cx="0" cy="0"/>
+          <a:chOff x="0" y="0"/>
+          <a:chExt cx="0" cy="0"/>
+        </a:xfrm>
+      </p:grpSpPr>
+      <p:sp>
+        <p:nvSpPr>
+          <p:cNvPr id="2" name="Titre 1"/>
+          <p:cNvSpPr>
+            <a:spLocks noGrp="1"/>
+          </p:cNvSpPr>
+          <p:nvPr>
+            <p:ph type="title"/>
+          </p:nvPr>
+        </p:nvSpPr>
+        <p:spPr/>
+        <p:txBody>
+          <a:bodyPr/>
+          <a:lstStyle/>
+          <a:p>
+            <a:r>
+              <a:rPr lang="fr-FR" dirty="0" err="1" smtClean="0"/>
+              <a:t>Issues.toString</a:t>
+            </a:r>
+            <a:endParaRPr lang="fr-FR" dirty="0"/>
+          </a:p>
+        </p:txBody>
+      </p:sp>
+      <p:sp>
+        <p:nvSpPr>
+          <p:cNvPr id="3" name="Espace réservé du contenu 2"/>
+          <p:cNvSpPr>
+            <a:spLocks noGrp="1"/>
+          </p:cNvSpPr>
+          <p:nvPr>
+            <p:ph idx="1"/>
+          </p:nvPr>
+        </p:nvSpPr>
+        <p:spPr/>
+        <p:txBody>
+          <a:bodyPr>
+            <a:normAutofit fontScale="55000" lnSpcReduction="20000"/>
+          </a:bodyPr>
+          <a:lstStyle/>
+          <a:p>
+            <a:pPr marL="0" indent="0">
+              <a:buNone/>
+            </a:pPr>
+            <a:endParaRPr lang="fr-FR" dirty="0" smtClean="0">
+              <a:solidFill>
+                <a:srgbClr val="FF0000"/>
+              </a:solidFill>
+            </a:endParaRPr>
+          </a:p>
+          <a:p>
+            <a:pPr marL="0" indent="0">
+              <a:buNone/>
+            </a:pPr>
+            <a:r>
+              <a:rPr lang="fr-FR" dirty="0" smtClean="0"/>
+              <a:t>issues </a:t>
+            </a:r>
+            <a:r>
+              <a:rPr lang="fr-FR" dirty="0"/>
+              <a:t>{</a:t>
+            </a:r>
+          </a:p>
+          <a:p>
+            <a:pPr marL="0" indent="0">
+              <a:buNone/>
+            </a:pPr>
+            <a:r>
+              <a:rPr lang="fr-FR" dirty="0"/>
+              <a:t>  id: "</a:t>
+            </a:r>
+            <a:r>
+              <a:rPr lang="fr-FR" dirty="0" smtClean="0"/>
+              <a:t>toto"</a:t>
+            </a:r>
+            <a:endParaRPr lang="fr-FR" dirty="0">
+              <a:solidFill>
+                <a:srgbClr val="FF0000"/>
+              </a:solidFill>
+            </a:endParaRPr>
+          </a:p>
+          <a:p>
+            <a:pPr marL="0" indent="0">
+              <a:buNone/>
+            </a:pPr>
+            <a:r>
+              <a:rPr lang="fr-FR" dirty="0"/>
+              <a:t>  </a:t>
+            </a:r>
+            <a:r>
+              <a:rPr lang="fr-FR" dirty="0" err="1"/>
+              <a:t>number</a:t>
+            </a:r>
+            <a:r>
+              <a:rPr lang="fr-FR" dirty="0"/>
+              <a:t>: </a:t>
+            </a:r>
+            <a:r>
+              <a:rPr lang="fr-FR" dirty="0" smtClean="0"/>
+              <a:t>41</a:t>
+            </a:r>
+            <a:endParaRPr lang="fr-FR" dirty="0">
+              <a:solidFill>
+                <a:srgbClr val="FF0000"/>
+              </a:solidFill>
+            </a:endParaRPr>
+          </a:p>
+          <a:p>
+            <a:pPr marL="0" indent="0">
+              <a:buNone/>
+            </a:pPr>
+            <a:r>
+              <a:rPr lang="fr-FR" dirty="0"/>
+              <a:t>  </a:t>
+            </a:r>
+            <a:r>
+              <a:rPr lang="fr-FR" dirty="0" err="1"/>
+              <a:t>title</a:t>
+            </a:r>
+            <a:r>
+              <a:rPr lang="fr-FR" dirty="0"/>
+              <a:t>: "Issue </a:t>
+            </a:r>
+            <a:r>
+              <a:rPr lang="fr-FR" dirty="0" smtClean="0"/>
+              <a:t>Toto"</a:t>
+            </a:r>
+            <a:endParaRPr lang="fr-FR" dirty="0">
+              <a:solidFill>
+                <a:srgbClr val="FF0000"/>
+              </a:solidFill>
+            </a:endParaRPr>
+          </a:p>
+          <a:p>
+            <a:pPr marL="0" indent="0">
+              <a:buNone/>
+            </a:pPr>
+            <a:r>
+              <a:rPr lang="fr-FR" dirty="0"/>
+              <a:t>  state: "</a:t>
+            </a:r>
+            <a:r>
+              <a:rPr lang="fr-FR" dirty="0" smtClean="0"/>
+              <a:t>Open"</a:t>
+            </a:r>
+            <a:endParaRPr lang="fr-FR" dirty="0">
+              <a:solidFill>
+                <a:srgbClr val="FF0000"/>
+              </a:solidFill>
+            </a:endParaRPr>
+          </a:p>
+          <a:p>
+            <a:pPr marL="0" indent="0">
+              <a:buNone/>
+            </a:pPr>
+            <a:r>
+              <a:rPr lang="fr-FR" dirty="0"/>
+              <a:t>  body: "This </a:t>
+            </a:r>
+            <a:r>
+              <a:rPr lang="fr-FR" dirty="0" err="1"/>
+              <a:t>is</a:t>
+            </a:r>
+            <a:r>
+              <a:rPr lang="fr-FR" dirty="0"/>
+              <a:t> a </a:t>
+            </a:r>
+            <a:r>
+              <a:rPr lang="fr-FR" dirty="0" smtClean="0"/>
+              <a:t>body"</a:t>
+            </a:r>
+            <a:endParaRPr lang="fr-FR" dirty="0">
+              <a:solidFill>
+                <a:srgbClr val="FF0000"/>
+              </a:solidFill>
+            </a:endParaRPr>
+          </a:p>
+          <a:p>
+            <a:pPr marL="0" indent="0">
+              <a:buNone/>
+            </a:pPr>
+            <a:r>
+              <a:rPr lang="fr-FR" dirty="0" smtClean="0"/>
+              <a:t>}</a:t>
+            </a:r>
+            <a:endParaRPr lang="fr-FR" dirty="0">
+              <a:solidFill>
+                <a:srgbClr val="FF0000"/>
+              </a:solidFill>
+            </a:endParaRPr>
+          </a:p>
+          <a:p>
+            <a:pPr marL="0" indent="0">
+              <a:buNone/>
+            </a:pPr>
+            <a:r>
+              <a:rPr lang="fr-FR" dirty="0"/>
+              <a:t>issues {</a:t>
+            </a:r>
+          </a:p>
+          <a:p>
+            <a:pPr marL="0" indent="0">
+              <a:buNone/>
+            </a:pPr>
+            <a:r>
+              <a:rPr lang="fr-FR" dirty="0"/>
+              <a:t>  id: "</a:t>
+            </a:r>
+            <a:r>
+              <a:rPr lang="fr-FR" dirty="0" smtClean="0"/>
+              <a:t>titi"</a:t>
+            </a:r>
+            <a:endParaRPr lang="fr-FR" dirty="0">
+              <a:solidFill>
+                <a:srgbClr val="FF0000"/>
+              </a:solidFill>
+            </a:endParaRPr>
+          </a:p>
+          <a:p>
+            <a:pPr marL="0" indent="0">
+              <a:buNone/>
+            </a:pPr>
+            <a:r>
+              <a:rPr lang="fr-FR" dirty="0"/>
+              <a:t>  </a:t>
+            </a:r>
+            <a:r>
+              <a:rPr lang="fr-FR" dirty="0" err="1"/>
+              <a:t>number</a:t>
+            </a:r>
+            <a:r>
+              <a:rPr lang="fr-FR" dirty="0"/>
+              <a:t>: </a:t>
+            </a:r>
+            <a:r>
+              <a:rPr lang="fr-FR" dirty="0" smtClean="0"/>
+              <a:t>32</a:t>
+            </a:r>
+            <a:endParaRPr lang="fr-FR" dirty="0">
+              <a:solidFill>
+                <a:srgbClr val="FF0000"/>
+              </a:solidFill>
+            </a:endParaRPr>
+          </a:p>
+          <a:p>
+            <a:pPr marL="0" indent="0">
+              <a:buNone/>
+            </a:pPr>
+            <a:r>
+              <a:rPr lang="fr-FR" dirty="0"/>
+              <a:t>  </a:t>
+            </a:r>
+            <a:r>
+              <a:rPr lang="fr-FR" dirty="0" err="1"/>
+              <a:t>title</a:t>
+            </a:r>
+            <a:r>
+              <a:rPr lang="fr-FR" dirty="0"/>
+              <a:t>: "Issue </a:t>
+            </a:r>
+            <a:r>
+              <a:rPr lang="fr-FR" dirty="0" smtClean="0"/>
+              <a:t>titi"</a:t>
+            </a:r>
+            <a:endParaRPr lang="fr-FR" dirty="0">
+              <a:solidFill>
+                <a:srgbClr val="FF0000"/>
+              </a:solidFill>
+            </a:endParaRPr>
+          </a:p>
+          <a:p>
+            <a:pPr marL="0" indent="0">
+              <a:buNone/>
+            </a:pPr>
+            <a:r>
+              <a:rPr lang="fr-FR" dirty="0"/>
+              <a:t>  state: "</a:t>
+            </a:r>
+            <a:r>
+              <a:rPr lang="fr-FR" dirty="0" err="1" smtClean="0"/>
+              <a:t>Closed</a:t>
+            </a:r>
+            <a:r>
+              <a:rPr lang="fr-FR" dirty="0" smtClean="0"/>
+              <a:t>"</a:t>
+            </a:r>
+            <a:endParaRPr lang="fr-FR" dirty="0">
+              <a:solidFill>
+                <a:srgbClr val="FF0000"/>
+              </a:solidFill>
+            </a:endParaRPr>
+          </a:p>
+          <a:p>
+            <a:pPr marL="0" indent="0">
+              <a:buNone/>
+            </a:pPr>
+            <a:r>
+              <a:rPr lang="fr-FR" dirty="0" smtClean="0"/>
+              <a:t>}</a:t>
+            </a:r>
+          </a:p>
+          <a:p>
+            <a:pPr marL="0" indent="0">
+              <a:buNone/>
+            </a:pPr>
+            <a:endParaRPr lang="fr-FR" dirty="0" smtClean="0">
+              <a:solidFill>
+                <a:srgbClr val="FF0000"/>
+              </a:solidFill>
+            </a:endParaRPr>
+          </a:p>
+          <a:p>
+            <a:pPr marL="0" indent="0">
+              <a:buNone/>
+            </a:pPr>
+            <a:r>
+              <a:rPr lang="fr-FR" dirty="0" smtClean="0">
+                <a:solidFill>
+                  <a:schemeClr val="bg1"/>
+                </a:solidFill>
+              </a:rPr>
+              <a:t>;</a:t>
+            </a:r>
+          </a:p>
+          <a:p>
+            <a:pPr marL="0" indent="0">
+              <a:buNone/>
+            </a:pPr>
+            <a:endParaRPr lang="fr-FR" dirty="0">
+              <a:solidFill>
+                <a:srgbClr val="FF0000"/>
+              </a:solidFill>
+            </a:endParaRPr>
+          </a:p>
+        </p:txBody>
+      </p:sp>
+    </p:spTree>
+    <p:extLst>
+      <p:ext uri="{BB962C8B-B14F-4D97-AF65-F5344CB8AC3E}">
+        <p14:creationId xmlns:p14="http://schemas.microsoft.com/office/powerpoint/2010/main" val="2850568754"/>
+      </p:ext>
+    </p:extLst>
+  </p:cSld>
+  <p:clrMapOvr>
+    <a:masterClrMapping/>
+  </p:clrMapOvr>
+</p:sld>
+</file>
+
+<file path=ppt/slides/slide22.xml><?xml version="1.0" encoding="utf-8"?>
+<p:sld xmlns:a="http://schemas.openxmlformats.org/drawingml/2006/main" xmlns:r="http://schemas.openxmlformats.org/officeDocument/2006/relationships" xmlns:p="http://schemas.openxmlformats.org/presentationml/2006/main">
+  <p:cSld>
+    <p:spTree>
+      <p:nvGrpSpPr>
+        <p:cNvPr id="1" name=""/>
+        <p:cNvGrpSpPr/>
+        <p:nvPr/>
+      </p:nvGrpSpPr>
+      <p:grpSpPr>
+        <a:xfrm>
+          <a:off x="0" y="0"/>
+          <a:ext cx="0" cy="0"/>
+          <a:chOff x="0" y="0"/>
+          <a:chExt cx="0" cy="0"/>
+        </a:xfrm>
+      </p:grpSpPr>
+      <p:sp>
+        <p:nvSpPr>
+          <p:cNvPr id="2" name="Titre 1"/>
+          <p:cNvSpPr>
+            <a:spLocks noGrp="1"/>
+          </p:cNvSpPr>
+          <p:nvPr>
+            <p:ph type="title"/>
+          </p:nvPr>
+        </p:nvSpPr>
+        <p:spPr/>
+        <p:txBody>
+          <a:bodyPr/>
+          <a:lstStyle/>
+          <a:p>
+            <a:r>
+              <a:rPr lang="fr-FR" dirty="0" err="1" smtClean="0"/>
+              <a:t>Issues.toString</a:t>
+            </a:r>
+            <a:endParaRPr lang="fr-FR" dirty="0"/>
+          </a:p>
+        </p:txBody>
+      </p:sp>
+      <p:sp>
+        <p:nvSpPr>
+          <p:cNvPr id="3" name="Espace réservé du contenu 2"/>
+          <p:cNvSpPr>
+            <a:spLocks noGrp="1"/>
+          </p:cNvSpPr>
+          <p:nvPr>
+            <p:ph idx="1"/>
+          </p:nvPr>
+        </p:nvSpPr>
+        <p:spPr/>
+        <p:txBody>
+          <a:bodyPr>
+            <a:normAutofit fontScale="55000" lnSpcReduction="20000"/>
+          </a:bodyPr>
+          <a:lstStyle/>
+          <a:p>
+            <a:pPr marL="0" indent="0">
+              <a:buNone/>
+            </a:pPr>
+            <a:r>
+              <a:rPr lang="fr-FR" dirty="0" smtClean="0">
+                <a:solidFill>
+                  <a:srgbClr val="FF0000"/>
+                </a:solidFill>
+              </a:rPr>
+              <a:t>[</a:t>
+            </a:r>
+          </a:p>
+          <a:p>
+            <a:pPr marL="0" indent="0">
+              <a:buNone/>
+            </a:pPr>
+            <a:r>
+              <a:rPr lang="fr-FR" dirty="0" smtClean="0"/>
+              <a:t>issues </a:t>
+            </a:r>
+            <a:r>
+              <a:rPr lang="fr-FR" dirty="0"/>
+              <a:t>{</a:t>
+            </a:r>
+          </a:p>
+          <a:p>
+            <a:pPr marL="0" indent="0">
+              <a:buNone/>
+            </a:pPr>
+            <a:r>
+              <a:rPr lang="fr-FR" dirty="0"/>
+              <a:t>  id: "</a:t>
+            </a:r>
+            <a:r>
+              <a:rPr lang="fr-FR" dirty="0" smtClean="0"/>
+              <a:t>toto"</a:t>
+            </a:r>
+            <a:r>
+              <a:rPr lang="fr-FR" dirty="0" smtClean="0">
+                <a:solidFill>
+                  <a:srgbClr val="FF0000"/>
+                </a:solidFill>
+              </a:rPr>
+              <a:t>,</a:t>
+            </a:r>
+            <a:endParaRPr lang="fr-FR" dirty="0">
+              <a:solidFill>
+                <a:srgbClr val="FF0000"/>
+              </a:solidFill>
+            </a:endParaRPr>
+          </a:p>
+          <a:p>
+            <a:pPr marL="0" indent="0">
+              <a:buNone/>
+            </a:pPr>
+            <a:r>
+              <a:rPr lang="fr-FR" dirty="0"/>
+              <a:t>  </a:t>
+            </a:r>
+            <a:r>
+              <a:rPr lang="fr-FR" dirty="0" err="1"/>
+              <a:t>number</a:t>
+            </a:r>
+            <a:r>
+              <a:rPr lang="fr-FR" dirty="0"/>
+              <a:t>: </a:t>
+            </a:r>
+            <a:r>
+              <a:rPr lang="fr-FR" dirty="0" smtClean="0"/>
+              <a:t>41</a:t>
+            </a:r>
+            <a:r>
+              <a:rPr lang="fr-FR" dirty="0" smtClean="0">
+                <a:solidFill>
+                  <a:srgbClr val="FF0000"/>
+                </a:solidFill>
+              </a:rPr>
+              <a:t>,</a:t>
+            </a:r>
+            <a:endParaRPr lang="fr-FR" dirty="0">
+              <a:solidFill>
+                <a:srgbClr val="FF0000"/>
+              </a:solidFill>
+            </a:endParaRPr>
+          </a:p>
+          <a:p>
+            <a:pPr marL="0" indent="0">
+              <a:buNone/>
+            </a:pPr>
+            <a:r>
+              <a:rPr lang="fr-FR" dirty="0"/>
+              <a:t>  </a:t>
+            </a:r>
+            <a:r>
+              <a:rPr lang="fr-FR" dirty="0" err="1"/>
+              <a:t>title</a:t>
+            </a:r>
+            <a:r>
+              <a:rPr lang="fr-FR" dirty="0"/>
+              <a:t>: "Issue </a:t>
+            </a:r>
+            <a:r>
+              <a:rPr lang="fr-FR" dirty="0" smtClean="0"/>
+              <a:t>Toto"</a:t>
+            </a:r>
+            <a:r>
+              <a:rPr lang="fr-FR" dirty="0" smtClean="0">
+                <a:solidFill>
+                  <a:srgbClr val="FF0000"/>
+                </a:solidFill>
+              </a:rPr>
+              <a:t>,</a:t>
+            </a:r>
+            <a:endParaRPr lang="fr-FR" dirty="0">
+              <a:solidFill>
+                <a:srgbClr val="FF0000"/>
+              </a:solidFill>
+            </a:endParaRPr>
+          </a:p>
+          <a:p>
+            <a:pPr marL="0" indent="0">
+              <a:buNone/>
+            </a:pPr>
+            <a:r>
+              <a:rPr lang="fr-FR" dirty="0"/>
+              <a:t>  state: "</a:t>
+            </a:r>
+            <a:r>
+              <a:rPr lang="fr-FR" dirty="0" smtClean="0"/>
+              <a:t>Open"</a:t>
+            </a:r>
+            <a:r>
+              <a:rPr lang="fr-FR" dirty="0" smtClean="0">
+                <a:solidFill>
+                  <a:srgbClr val="FF0000"/>
+                </a:solidFill>
+              </a:rPr>
+              <a:t>,</a:t>
+            </a:r>
+            <a:endParaRPr lang="fr-FR" dirty="0">
+              <a:solidFill>
+                <a:srgbClr val="FF0000"/>
+              </a:solidFill>
+            </a:endParaRPr>
+          </a:p>
+          <a:p>
+            <a:pPr marL="0" indent="0">
+              <a:buNone/>
+            </a:pPr>
+            <a:r>
+              <a:rPr lang="fr-FR" dirty="0"/>
+              <a:t>  body: "This </a:t>
+            </a:r>
+            <a:r>
+              <a:rPr lang="fr-FR" dirty="0" err="1"/>
+              <a:t>is</a:t>
+            </a:r>
+            <a:r>
+              <a:rPr lang="fr-FR" dirty="0"/>
+              <a:t> a </a:t>
+            </a:r>
+            <a:r>
+              <a:rPr lang="fr-FR" dirty="0" smtClean="0"/>
+              <a:t>body"</a:t>
+            </a:r>
+            <a:r>
+              <a:rPr lang="fr-FR" dirty="0" smtClean="0">
+                <a:solidFill>
+                  <a:srgbClr val="FF0000"/>
+                </a:solidFill>
+              </a:rPr>
+              <a:t>,</a:t>
+            </a:r>
+            <a:endParaRPr lang="fr-FR" dirty="0">
+              <a:solidFill>
+                <a:srgbClr val="FF0000"/>
+              </a:solidFill>
+            </a:endParaRPr>
+          </a:p>
+          <a:p>
+            <a:pPr marL="0" indent="0">
+              <a:buNone/>
+            </a:pPr>
+            <a:r>
+              <a:rPr lang="fr-FR" dirty="0" smtClean="0"/>
+              <a:t>}</a:t>
+            </a:r>
+            <a:r>
+              <a:rPr lang="fr-FR" dirty="0" smtClean="0">
+                <a:solidFill>
+                  <a:srgbClr val="FF0000"/>
+                </a:solidFill>
+              </a:rPr>
+              <a:t>,</a:t>
+            </a:r>
+            <a:endParaRPr lang="fr-FR" dirty="0">
+              <a:solidFill>
+                <a:srgbClr val="FF0000"/>
+              </a:solidFill>
+            </a:endParaRPr>
+          </a:p>
+          <a:p>
+            <a:pPr marL="0" indent="0">
+              <a:buNone/>
+            </a:pPr>
+            <a:r>
+              <a:rPr lang="fr-FR" dirty="0"/>
+              <a:t>issues {</a:t>
+            </a:r>
+          </a:p>
+          <a:p>
+            <a:pPr marL="0" indent="0">
+              <a:buNone/>
+            </a:pPr>
+            <a:r>
+              <a:rPr lang="fr-FR" dirty="0"/>
+              <a:t>  id: "</a:t>
+            </a:r>
+            <a:r>
+              <a:rPr lang="fr-FR" dirty="0" smtClean="0"/>
+              <a:t>titi"</a:t>
+            </a:r>
+            <a:r>
+              <a:rPr lang="fr-FR" dirty="0" smtClean="0">
+                <a:solidFill>
+                  <a:srgbClr val="FF0000"/>
+                </a:solidFill>
+              </a:rPr>
+              <a:t>,</a:t>
+            </a:r>
+            <a:endParaRPr lang="fr-FR" dirty="0">
+              <a:solidFill>
+                <a:srgbClr val="FF0000"/>
+              </a:solidFill>
+            </a:endParaRPr>
+          </a:p>
+          <a:p>
+            <a:pPr marL="0" indent="0">
+              <a:buNone/>
+            </a:pPr>
+            <a:r>
+              <a:rPr lang="fr-FR" dirty="0"/>
+              <a:t>  </a:t>
+            </a:r>
+            <a:r>
+              <a:rPr lang="fr-FR" dirty="0" err="1"/>
+              <a:t>number</a:t>
+            </a:r>
+            <a:r>
+              <a:rPr lang="fr-FR" dirty="0"/>
+              <a:t>: </a:t>
+            </a:r>
+            <a:r>
+              <a:rPr lang="fr-FR" dirty="0" smtClean="0"/>
+              <a:t>32</a:t>
+            </a:r>
+            <a:r>
+              <a:rPr lang="fr-FR" dirty="0" smtClean="0">
+                <a:solidFill>
+                  <a:srgbClr val="FF0000"/>
+                </a:solidFill>
+              </a:rPr>
+              <a:t>,</a:t>
+            </a:r>
+            <a:endParaRPr lang="fr-FR" dirty="0">
+              <a:solidFill>
+                <a:srgbClr val="FF0000"/>
+              </a:solidFill>
+            </a:endParaRPr>
+          </a:p>
+          <a:p>
+            <a:pPr marL="0" indent="0">
+              <a:buNone/>
+            </a:pPr>
+            <a:r>
+              <a:rPr lang="fr-FR" dirty="0"/>
+              <a:t>  </a:t>
+            </a:r>
+            <a:r>
+              <a:rPr lang="fr-FR" dirty="0" err="1"/>
+              <a:t>title</a:t>
+            </a:r>
+            <a:r>
+              <a:rPr lang="fr-FR" dirty="0"/>
+              <a:t>: "Issue </a:t>
+            </a:r>
+            <a:r>
+              <a:rPr lang="fr-FR" dirty="0" smtClean="0"/>
+              <a:t>titi"</a:t>
+            </a:r>
+            <a:r>
+              <a:rPr lang="fr-FR" dirty="0" smtClean="0">
+                <a:solidFill>
+                  <a:srgbClr val="FF0000"/>
+                </a:solidFill>
+              </a:rPr>
+              <a:t>,</a:t>
+            </a:r>
+            <a:endParaRPr lang="fr-FR" dirty="0">
+              <a:solidFill>
+                <a:srgbClr val="FF0000"/>
+              </a:solidFill>
+            </a:endParaRPr>
+          </a:p>
+          <a:p>
+            <a:pPr marL="0" indent="0">
+              <a:buNone/>
+            </a:pPr>
+            <a:r>
+              <a:rPr lang="fr-FR" dirty="0"/>
+              <a:t>  state: "</a:t>
+            </a:r>
+            <a:r>
+              <a:rPr lang="fr-FR" dirty="0" err="1" smtClean="0"/>
+              <a:t>Closed</a:t>
+            </a:r>
+            <a:r>
+              <a:rPr lang="fr-FR" dirty="0" smtClean="0"/>
+              <a:t>"</a:t>
+            </a:r>
+            <a:r>
+              <a:rPr lang="fr-FR" dirty="0" smtClean="0">
+                <a:solidFill>
+                  <a:srgbClr val="FF0000"/>
+                </a:solidFill>
+              </a:rPr>
+              <a:t>,</a:t>
+            </a:r>
+            <a:endParaRPr lang="fr-FR" dirty="0">
+              <a:solidFill>
+                <a:srgbClr val="FF0000"/>
+              </a:solidFill>
+            </a:endParaRPr>
+          </a:p>
+          <a:p>
+            <a:pPr marL="0" indent="0">
+              <a:buNone/>
+            </a:pPr>
+            <a:r>
+              <a:rPr lang="fr-FR" dirty="0" smtClean="0"/>
+              <a:t>}</a:t>
+            </a:r>
+          </a:p>
+          <a:p>
+            <a:pPr marL="0" indent="0">
+              <a:buNone/>
+            </a:pPr>
+            <a:r>
+              <a:rPr lang="fr-FR" dirty="0">
+                <a:solidFill>
+                  <a:srgbClr val="FF0000"/>
+                </a:solidFill>
+              </a:rPr>
+              <a:t>]</a:t>
+            </a:r>
+          </a:p>
+        </p:txBody>
+      </p:sp>
+    </p:spTree>
+    <p:extLst>
+      <p:ext uri="{BB962C8B-B14F-4D97-AF65-F5344CB8AC3E}">
+        <p14:creationId xmlns:p14="http://schemas.microsoft.com/office/powerpoint/2010/main" val="1564795068"/>
+      </p:ext>
+    </p:extLst>
+  </p:cSld>
+  <p:clrMapOvr>
+    <a:masterClrMapping/>
+  </p:clrMapOvr>
+</p:sld>
+</file>
+
+<file path=ppt/slides/slide23.xml><?xml version="1.0" encoding="utf-8"?>
+<p:sld xmlns:a="http://schemas.openxmlformats.org/drawingml/2006/main" xmlns:r="http://schemas.openxmlformats.org/officeDocument/2006/relationships" xmlns:p="http://schemas.openxmlformats.org/presentationml/2006/main">
+  <p:cSld>
+    <p:spTree>
+      <p:nvGrpSpPr>
+        <p:cNvPr id="1" name=""/>
+        <p:cNvGrpSpPr/>
+        <p:nvPr/>
+      </p:nvGrpSpPr>
+      <p:grpSpPr>
+        <a:xfrm>
+          <a:off x="0" y="0"/>
+          <a:ext cx="0" cy="0"/>
+          <a:chOff x="0" y="0"/>
+          <a:chExt cx="0" cy="0"/>
+        </a:xfrm>
+      </p:grpSpPr>
+      <p:sp>
+        <p:nvSpPr>
+          <p:cNvPr id="2" name="Titre 1"/>
+          <p:cNvSpPr>
+            <a:spLocks noGrp="1"/>
+          </p:cNvSpPr>
+          <p:nvPr>
+            <p:ph type="title"/>
+          </p:nvPr>
+        </p:nvSpPr>
+        <p:spPr/>
+        <p:txBody>
+          <a:bodyPr/>
+          <a:lstStyle/>
+          <a:p>
+            <a:r>
+              <a:rPr lang="fr-FR" dirty="0" err="1" smtClean="0"/>
+              <a:t>Issues.toString</a:t>
+            </a:r>
+            <a:endParaRPr lang="fr-FR" dirty="0"/>
+          </a:p>
+        </p:txBody>
+      </p:sp>
+      <p:sp>
+        <p:nvSpPr>
+          <p:cNvPr id="3" name="Espace réservé du contenu 2"/>
+          <p:cNvSpPr>
+            <a:spLocks noGrp="1"/>
+          </p:cNvSpPr>
+          <p:nvPr>
+            <p:ph idx="1"/>
+          </p:nvPr>
+        </p:nvSpPr>
+        <p:spPr/>
+        <p:txBody>
+          <a:bodyPr>
+            <a:normAutofit fontScale="55000" lnSpcReduction="20000"/>
+          </a:bodyPr>
+          <a:lstStyle/>
+          <a:p>
+            <a:pPr marL="0" indent="0">
+              <a:buNone/>
+            </a:pPr>
+            <a:r>
+              <a:rPr lang="fr-FR" dirty="0" smtClean="0">
+                <a:solidFill>
+                  <a:srgbClr val="FF0000"/>
+                </a:solidFill>
+              </a:rPr>
+              <a:t>[</a:t>
+            </a:r>
+          </a:p>
+          <a:p>
+            <a:pPr marL="0" indent="0">
+              <a:buNone/>
+            </a:pPr>
+            <a:r>
+              <a:rPr lang="fr-FR" dirty="0" smtClean="0"/>
+              <a:t>{</a:t>
+            </a:r>
+            <a:endParaRPr lang="fr-FR" dirty="0"/>
+          </a:p>
+          <a:p>
+            <a:pPr marL="0" indent="0">
+              <a:buNone/>
+            </a:pPr>
+            <a:r>
+              <a:rPr lang="fr-FR" dirty="0"/>
+              <a:t>  id: "</a:t>
+            </a:r>
+            <a:r>
+              <a:rPr lang="fr-FR" dirty="0" smtClean="0"/>
+              <a:t>toto"</a:t>
+            </a:r>
+            <a:r>
+              <a:rPr lang="fr-FR" dirty="0" smtClean="0">
+                <a:solidFill>
+                  <a:srgbClr val="FF0000"/>
+                </a:solidFill>
+              </a:rPr>
+              <a:t>,</a:t>
+            </a:r>
+            <a:endParaRPr lang="fr-FR" dirty="0">
+              <a:solidFill>
+                <a:srgbClr val="FF0000"/>
+              </a:solidFill>
+            </a:endParaRPr>
+          </a:p>
+          <a:p>
+            <a:pPr marL="0" indent="0">
+              <a:buNone/>
+            </a:pPr>
+            <a:r>
+              <a:rPr lang="fr-FR" dirty="0"/>
+              <a:t>  </a:t>
+            </a:r>
+            <a:r>
+              <a:rPr lang="fr-FR" dirty="0" err="1"/>
+              <a:t>number</a:t>
+            </a:r>
+            <a:r>
+              <a:rPr lang="fr-FR" dirty="0"/>
+              <a:t>: </a:t>
+            </a:r>
+            <a:r>
+              <a:rPr lang="fr-FR" dirty="0" smtClean="0"/>
+              <a:t>41</a:t>
+            </a:r>
+            <a:r>
+              <a:rPr lang="fr-FR" dirty="0" smtClean="0">
+                <a:solidFill>
+                  <a:srgbClr val="FF0000"/>
+                </a:solidFill>
+              </a:rPr>
+              <a:t>,</a:t>
+            </a:r>
+            <a:endParaRPr lang="fr-FR" dirty="0">
+              <a:solidFill>
+                <a:srgbClr val="FF0000"/>
+              </a:solidFill>
+            </a:endParaRPr>
+          </a:p>
+          <a:p>
+            <a:pPr marL="0" indent="0">
+              <a:buNone/>
+            </a:pPr>
+            <a:r>
+              <a:rPr lang="fr-FR" dirty="0"/>
+              <a:t>  </a:t>
+            </a:r>
+            <a:r>
+              <a:rPr lang="fr-FR" dirty="0" err="1"/>
+              <a:t>title</a:t>
+            </a:r>
+            <a:r>
+              <a:rPr lang="fr-FR" dirty="0"/>
+              <a:t>: "Issue </a:t>
+            </a:r>
+            <a:r>
+              <a:rPr lang="fr-FR" dirty="0" smtClean="0"/>
+              <a:t>Toto"</a:t>
+            </a:r>
+            <a:r>
+              <a:rPr lang="fr-FR" dirty="0" smtClean="0">
+                <a:solidFill>
+                  <a:srgbClr val="FF0000"/>
+                </a:solidFill>
+              </a:rPr>
+              <a:t>,</a:t>
+            </a:r>
+            <a:endParaRPr lang="fr-FR" dirty="0">
+              <a:solidFill>
+                <a:srgbClr val="FF0000"/>
+              </a:solidFill>
+            </a:endParaRPr>
+          </a:p>
+          <a:p>
+            <a:pPr marL="0" indent="0">
+              <a:buNone/>
+            </a:pPr>
+            <a:r>
+              <a:rPr lang="fr-FR" dirty="0"/>
+              <a:t>  state: "</a:t>
+            </a:r>
+            <a:r>
+              <a:rPr lang="fr-FR" dirty="0" smtClean="0"/>
+              <a:t>Open"</a:t>
+            </a:r>
+            <a:r>
+              <a:rPr lang="fr-FR" dirty="0" smtClean="0">
+                <a:solidFill>
+                  <a:srgbClr val="FF0000"/>
+                </a:solidFill>
+              </a:rPr>
+              <a:t>,</a:t>
+            </a:r>
+            <a:endParaRPr lang="fr-FR" dirty="0">
+              <a:solidFill>
+                <a:srgbClr val="FF0000"/>
+              </a:solidFill>
+            </a:endParaRPr>
+          </a:p>
+          <a:p>
+            <a:pPr marL="0" indent="0">
+              <a:buNone/>
+            </a:pPr>
+            <a:r>
+              <a:rPr lang="fr-FR" dirty="0"/>
+              <a:t>  body: "This </a:t>
+            </a:r>
+            <a:r>
+              <a:rPr lang="fr-FR" dirty="0" err="1"/>
+              <a:t>is</a:t>
+            </a:r>
+            <a:r>
+              <a:rPr lang="fr-FR" dirty="0"/>
+              <a:t> a </a:t>
+            </a:r>
+            <a:r>
+              <a:rPr lang="fr-FR" dirty="0" smtClean="0"/>
+              <a:t>body"</a:t>
+            </a:r>
+            <a:r>
+              <a:rPr lang="fr-FR" dirty="0" smtClean="0">
+                <a:solidFill>
+                  <a:srgbClr val="FF0000"/>
+                </a:solidFill>
+              </a:rPr>
+              <a:t>,</a:t>
+            </a:r>
+            <a:endParaRPr lang="fr-FR" dirty="0">
+              <a:solidFill>
+                <a:srgbClr val="FF0000"/>
+              </a:solidFill>
+            </a:endParaRPr>
+          </a:p>
+          <a:p>
+            <a:pPr marL="0" indent="0">
+              <a:buNone/>
+            </a:pPr>
+            <a:r>
+              <a:rPr lang="fr-FR" dirty="0" smtClean="0"/>
+              <a:t>}</a:t>
+            </a:r>
+            <a:r>
+              <a:rPr lang="fr-FR" dirty="0" smtClean="0">
+                <a:solidFill>
+                  <a:srgbClr val="FF0000"/>
+                </a:solidFill>
+              </a:rPr>
+              <a:t>,</a:t>
+            </a:r>
+            <a:endParaRPr lang="fr-FR" dirty="0">
+              <a:solidFill>
+                <a:srgbClr val="FF0000"/>
+              </a:solidFill>
+            </a:endParaRPr>
+          </a:p>
+          <a:p>
+            <a:pPr marL="0" indent="0">
+              <a:buNone/>
+            </a:pPr>
+            <a:r>
+              <a:rPr lang="fr-FR" dirty="0" smtClean="0"/>
+              <a:t>{</a:t>
+            </a:r>
+            <a:endParaRPr lang="fr-FR" dirty="0"/>
+          </a:p>
+          <a:p>
+            <a:pPr marL="0" indent="0">
+              <a:buNone/>
+            </a:pPr>
+            <a:r>
+              <a:rPr lang="fr-FR" dirty="0"/>
+              <a:t>  id: "</a:t>
+            </a:r>
+            <a:r>
+              <a:rPr lang="fr-FR" dirty="0" smtClean="0"/>
+              <a:t>titi"</a:t>
+            </a:r>
+            <a:r>
+              <a:rPr lang="fr-FR" dirty="0" smtClean="0">
+                <a:solidFill>
+                  <a:srgbClr val="FF0000"/>
+                </a:solidFill>
+              </a:rPr>
+              <a:t>,</a:t>
+            </a:r>
+            <a:endParaRPr lang="fr-FR" dirty="0">
+              <a:solidFill>
+                <a:srgbClr val="FF0000"/>
+              </a:solidFill>
+            </a:endParaRPr>
+          </a:p>
+          <a:p>
+            <a:pPr marL="0" indent="0">
+              <a:buNone/>
+            </a:pPr>
+            <a:r>
+              <a:rPr lang="fr-FR" dirty="0"/>
+              <a:t>  </a:t>
+            </a:r>
+            <a:r>
+              <a:rPr lang="fr-FR" dirty="0" err="1"/>
+              <a:t>number</a:t>
+            </a:r>
+            <a:r>
+              <a:rPr lang="fr-FR" dirty="0"/>
+              <a:t>: </a:t>
+            </a:r>
+            <a:r>
+              <a:rPr lang="fr-FR" dirty="0" smtClean="0"/>
+              <a:t>32</a:t>
+            </a:r>
+            <a:r>
+              <a:rPr lang="fr-FR" dirty="0" smtClean="0">
+                <a:solidFill>
+                  <a:srgbClr val="FF0000"/>
+                </a:solidFill>
+              </a:rPr>
+              <a:t>,</a:t>
+            </a:r>
+            <a:endParaRPr lang="fr-FR" dirty="0">
+              <a:solidFill>
+                <a:srgbClr val="FF0000"/>
+              </a:solidFill>
+            </a:endParaRPr>
+          </a:p>
+          <a:p>
+            <a:pPr marL="0" indent="0">
+              <a:buNone/>
+            </a:pPr>
+            <a:r>
+              <a:rPr lang="fr-FR" dirty="0"/>
+              <a:t>  </a:t>
+            </a:r>
+            <a:r>
+              <a:rPr lang="fr-FR" dirty="0" err="1"/>
+              <a:t>title</a:t>
+            </a:r>
+            <a:r>
+              <a:rPr lang="fr-FR" dirty="0"/>
+              <a:t>: "Issue </a:t>
+            </a:r>
+            <a:r>
+              <a:rPr lang="fr-FR" dirty="0" smtClean="0"/>
+              <a:t>titi"</a:t>
+            </a:r>
+            <a:r>
+              <a:rPr lang="fr-FR" dirty="0" smtClean="0">
+                <a:solidFill>
+                  <a:srgbClr val="FF0000"/>
+                </a:solidFill>
+              </a:rPr>
+              <a:t>,</a:t>
+            </a:r>
+            <a:endParaRPr lang="fr-FR" dirty="0">
+              <a:solidFill>
+                <a:srgbClr val="FF0000"/>
+              </a:solidFill>
+            </a:endParaRPr>
+          </a:p>
+          <a:p>
+            <a:pPr marL="0" indent="0">
+              <a:buNone/>
+            </a:pPr>
+            <a:r>
+              <a:rPr lang="fr-FR" dirty="0"/>
+              <a:t>  state: "</a:t>
+            </a:r>
+            <a:r>
+              <a:rPr lang="fr-FR" dirty="0" err="1" smtClean="0"/>
+              <a:t>Closed</a:t>
+            </a:r>
+            <a:r>
+              <a:rPr lang="fr-FR" dirty="0" smtClean="0"/>
+              <a:t>"</a:t>
+            </a:r>
+            <a:r>
+              <a:rPr lang="fr-FR" dirty="0" smtClean="0">
+                <a:solidFill>
+                  <a:srgbClr val="FF0000"/>
+                </a:solidFill>
+              </a:rPr>
+              <a:t>,</a:t>
+            </a:r>
+            <a:endParaRPr lang="fr-FR" dirty="0">
+              <a:solidFill>
+                <a:srgbClr val="FF0000"/>
+              </a:solidFill>
+            </a:endParaRPr>
+          </a:p>
+          <a:p>
+            <a:pPr marL="0" indent="0">
+              <a:buNone/>
+            </a:pPr>
+            <a:r>
+              <a:rPr lang="fr-FR" dirty="0" smtClean="0"/>
+              <a:t>}</a:t>
+            </a:r>
+          </a:p>
+          <a:p>
+            <a:pPr marL="0" indent="0">
+              <a:buNone/>
+            </a:pPr>
+            <a:r>
+              <a:rPr lang="fr-FR" dirty="0">
+                <a:solidFill>
+                  <a:srgbClr val="FF0000"/>
+                </a:solidFill>
+              </a:rPr>
+              <a:t>]</a:t>
+            </a:r>
+          </a:p>
+        </p:txBody>
+      </p:sp>
+    </p:spTree>
+    <p:extLst>
+      <p:ext uri="{BB962C8B-B14F-4D97-AF65-F5344CB8AC3E}">
+        <p14:creationId xmlns:p14="http://schemas.microsoft.com/office/powerpoint/2010/main" val="1574338818"/>
+      </p:ext>
+    </p:extLst>
+  </p:cSld>
+  <p:clrMapOvr>
+    <a:masterClrMapping/>
+  </p:clrMapOvr>
+</p:sld>
+</file>
+
+<file path=ppt/slides/slide24.xml><?xml version="1.0" encoding="utf-8"?>
+<p:sld xmlns:a="http://schemas.openxmlformats.org/drawingml/2006/main" xmlns:r="http://schemas.openxmlformats.org/officeDocument/2006/relationships" xmlns:p="http://schemas.openxmlformats.org/presentationml/2006/main">
+  <p:cSld>
+    <p:spTree>
+      <p:nvGrpSpPr>
+        <p:cNvPr id="1" name=""/>
+        <p:cNvGrpSpPr/>
+        <p:nvPr/>
+      </p:nvGrpSpPr>
+      <p:grpSpPr>
+        <a:xfrm>
+          <a:off x="0" y="0"/>
+          <a:ext cx="0" cy="0"/>
+          <a:chOff x="0" y="0"/>
+          <a:chExt cx="0" cy="0"/>
+        </a:xfrm>
+      </p:grpSpPr>
+      <p:sp>
+        <p:nvSpPr>
+          <p:cNvPr id="2" name="Titre 1"/>
+          <p:cNvSpPr>
+            <a:spLocks noGrp="1"/>
+          </p:cNvSpPr>
+          <p:nvPr>
+            <p:ph type="title"/>
+          </p:nvPr>
+        </p:nvSpPr>
+        <p:spPr/>
+        <p:txBody>
+          <a:bodyPr/>
+          <a:lstStyle/>
+          <a:p>
+            <a:r>
+              <a:rPr lang="fr-FR" dirty="0" err="1" smtClean="0"/>
+              <a:t>Converter</a:t>
+            </a:r>
+            <a:endParaRPr lang="fr-FR" dirty="0"/>
+          </a:p>
+        </p:txBody>
+      </p:sp>
+      <p:sp>
+        <p:nvSpPr>
+          <p:cNvPr id="3" name="Espace réservé du contenu 2"/>
+          <p:cNvSpPr>
+            <a:spLocks noGrp="1"/>
+          </p:cNvSpPr>
+          <p:nvPr>
+            <p:ph idx="1"/>
+          </p:nvPr>
+        </p:nvSpPr>
+        <p:spPr/>
+        <p:txBody>
+          <a:bodyPr>
+            <a:normAutofit lnSpcReduction="10000"/>
+          </a:bodyPr>
+          <a:lstStyle/>
+          <a:p>
+            <a:r>
+              <a:rPr lang="fr-FR" dirty="0" smtClean="0"/>
+              <a:t>Conversion </a:t>
+            </a:r>
+            <a:r>
+              <a:rPr lang="fr-FR" dirty="0" err="1" smtClean="0"/>
+              <a:t>protobuf</a:t>
+            </a:r>
+            <a:r>
+              <a:rPr lang="fr-FR" dirty="0" smtClean="0"/>
+              <a:t> -&gt; </a:t>
+            </a:r>
+            <a:r>
+              <a:rPr lang="fr-FR" dirty="0" err="1" smtClean="0"/>
+              <a:t>json</a:t>
+            </a:r>
+            <a:r>
+              <a:rPr lang="fr-FR" dirty="0" smtClean="0"/>
+              <a:t> OK</a:t>
+            </a:r>
+          </a:p>
+          <a:p>
+            <a:endParaRPr lang="fr-FR" dirty="0"/>
+          </a:p>
+          <a:p>
+            <a:r>
+              <a:rPr lang="fr-FR" dirty="0" err="1" smtClean="0"/>
+              <a:t>Json</a:t>
+            </a:r>
+            <a:r>
+              <a:rPr lang="fr-FR" dirty="0" smtClean="0"/>
+              <a:t> -&gt; </a:t>
+            </a:r>
+            <a:r>
+              <a:rPr lang="fr-FR" dirty="0" err="1" smtClean="0"/>
+              <a:t>protobuf</a:t>
+            </a:r>
+            <a:r>
+              <a:rPr lang="fr-FR" dirty="0" smtClean="0"/>
+              <a:t> ? </a:t>
+            </a:r>
+            <a:endParaRPr lang="fr-FR" dirty="0"/>
+          </a:p>
+          <a:p>
+            <a:pPr lvl="1"/>
+            <a:r>
+              <a:rPr lang="fr-FR" dirty="0" smtClean="0"/>
+              <a:t>OK gr</a:t>
+            </a:r>
+            <a:r>
+              <a:rPr lang="fr-FR" dirty="0" smtClean="0"/>
+              <a:t>âce au </a:t>
+            </a:r>
+            <a:r>
+              <a:rPr lang="fr-FR" dirty="0" err="1" smtClean="0"/>
+              <a:t>parsing</a:t>
+            </a:r>
+            <a:r>
+              <a:rPr lang="fr-FR" dirty="0" smtClean="0"/>
+              <a:t> </a:t>
+            </a:r>
+            <a:r>
+              <a:rPr lang="fr-FR" dirty="0" err="1" smtClean="0"/>
+              <a:t>json</a:t>
+            </a:r>
+            <a:endParaRPr lang="fr-FR" dirty="0" smtClean="0"/>
+          </a:p>
+          <a:p>
+            <a:pPr lvl="1"/>
+            <a:r>
+              <a:rPr lang="fr-FR" dirty="0" smtClean="0"/>
+              <a:t>OK grâce aux </a:t>
+            </a:r>
+            <a:r>
+              <a:rPr lang="fr-FR" dirty="0" err="1" smtClean="0"/>
+              <a:t>FieldDescriptor</a:t>
+            </a:r>
+            <a:r>
+              <a:rPr lang="fr-FR" dirty="0" smtClean="0"/>
+              <a:t> qui contiennent :</a:t>
+            </a:r>
+          </a:p>
+          <a:p>
+            <a:pPr lvl="2"/>
+            <a:r>
+              <a:rPr lang="fr-FR" dirty="0" smtClean="0"/>
+              <a:t>Nom</a:t>
+            </a:r>
+          </a:p>
+          <a:p>
+            <a:pPr lvl="2"/>
+            <a:r>
+              <a:rPr lang="fr-FR" dirty="0" smtClean="0"/>
+              <a:t>Numéro</a:t>
+            </a:r>
+          </a:p>
+          <a:p>
+            <a:pPr lvl="2"/>
+            <a:r>
+              <a:rPr lang="fr-FR" dirty="0" smtClean="0"/>
+              <a:t>Type et Type Java</a:t>
+            </a:r>
+          </a:p>
+          <a:p>
+            <a:pPr lvl="2"/>
+            <a:r>
+              <a:rPr lang="fr-FR" dirty="0" smtClean="0"/>
+              <a:t>Et plus encore</a:t>
+            </a:r>
+            <a:r>
+              <a:rPr lang="is-IS" dirty="0" smtClean="0"/>
+              <a:t>…</a:t>
+            </a:r>
+            <a:endParaRPr lang="fr-FR" dirty="0" smtClean="0"/>
+          </a:p>
+          <a:p>
+            <a:pPr lvl="2"/>
+            <a:endParaRPr lang="fr-FR" dirty="0"/>
+          </a:p>
+        </p:txBody>
+      </p:sp>
+    </p:spTree>
+    <p:extLst>
+      <p:ext uri="{BB962C8B-B14F-4D97-AF65-F5344CB8AC3E}">
+        <p14:creationId xmlns:p14="http://schemas.microsoft.com/office/powerpoint/2010/main" val="2654535821"/>
+      </p:ext>
+    </p:extLst>
+  </p:cSld>
+  <p:clrMapOvr>
+    <a:masterClrMapping/>
+  </p:clrMapOvr>
+</p:sld>
+</file>
+
+<file path=ppt/slides/slide25.xml><?xml version="1.0" encoding="utf-8"?>
+<p:sld xmlns:a="http://schemas.openxmlformats.org/drawingml/2006/main" xmlns:r="http://schemas.openxmlformats.org/officeDocument/2006/relationships" xmlns:p="http://schemas.openxmlformats.org/presentationml/2006/main">
+  <p:cSld>
+    <p:spTree>
+      <p:nvGrpSpPr>
+        <p:cNvPr id="1" name=""/>
+        <p:cNvGrpSpPr/>
+        <p:nvPr/>
+      </p:nvGrpSpPr>
+      <p:grpSpPr>
+        <a:xfrm>
+          <a:off x="0" y="0"/>
+          <a:ext cx="0" cy="0"/>
+          <a:chOff x="0" y="0"/>
+          <a:chExt cx="0" cy="0"/>
+        </a:xfrm>
+      </p:grpSpPr>
+      <p:sp>
+        <p:nvSpPr>
+          <p:cNvPr id="2" name="Titre 1"/>
+          <p:cNvSpPr>
+            <a:spLocks noGrp="1"/>
+          </p:cNvSpPr>
+          <p:nvPr>
+            <p:ph type="title"/>
+          </p:nvPr>
+        </p:nvSpPr>
+        <p:spPr/>
+        <p:txBody>
+          <a:bodyPr/>
+          <a:lstStyle/>
+          <a:p>
+            <a:r>
+              <a:rPr lang="fr-FR" dirty="0" err="1" smtClean="0"/>
+              <a:t>AnyProto</a:t>
+            </a:r>
+            <a:endParaRPr lang="fr-FR" dirty="0"/>
+          </a:p>
+        </p:txBody>
+      </p:sp>
+      <p:sp>
+        <p:nvSpPr>
+          <p:cNvPr id="3" name="Espace réservé du contenu 2"/>
+          <p:cNvSpPr>
+            <a:spLocks noGrp="1"/>
+          </p:cNvSpPr>
+          <p:nvPr>
+            <p:ph idx="1"/>
+          </p:nvPr>
+        </p:nvSpPr>
+        <p:spPr/>
+        <p:txBody>
+          <a:bodyPr>
+            <a:normAutofit lnSpcReduction="10000"/>
+          </a:bodyPr>
+          <a:lstStyle/>
+          <a:p>
+            <a:r>
+              <a:rPr lang="fr-FR" dirty="0" smtClean="0"/>
+              <a:t>Librairie Perso : </a:t>
+            </a:r>
+          </a:p>
+          <a:p>
+            <a:pPr lvl="1"/>
+            <a:r>
+              <a:rPr lang="fr-FR" dirty="0">
+                <a:hlinkClick r:id="rId2"/>
+              </a:rPr>
+              <a:t>https://github.com/TheCopycat/</a:t>
+            </a:r>
+            <a:r>
+              <a:rPr lang="fr-FR" dirty="0" smtClean="0">
+                <a:hlinkClick r:id="rId2"/>
+              </a:rPr>
+              <a:t>anyproto</a:t>
+            </a:r>
+            <a:endParaRPr lang="fr-FR" dirty="0" smtClean="0"/>
+          </a:p>
+          <a:p>
+            <a:pPr lvl="1"/>
+            <a:endParaRPr lang="fr-FR" dirty="0"/>
+          </a:p>
+          <a:p>
+            <a:r>
+              <a:rPr lang="fr-FR" dirty="0" smtClean="0"/>
+              <a:t>Contient : </a:t>
+            </a:r>
+          </a:p>
+          <a:p>
+            <a:pPr lvl="1"/>
+            <a:r>
+              <a:rPr lang="fr-FR" dirty="0" err="1" smtClean="0"/>
+              <a:t>AnyProto</a:t>
+            </a:r>
+            <a:r>
+              <a:rPr lang="fr-FR" dirty="0" smtClean="0"/>
+              <a:t> : Une classe qui permet de convertir n’importe quoi &lt;-&gt; </a:t>
+            </a:r>
+            <a:r>
+              <a:rPr lang="fr-FR" dirty="0" err="1" smtClean="0"/>
+              <a:t>protobuf</a:t>
+            </a:r>
+            <a:r>
+              <a:rPr lang="fr-FR" dirty="0" smtClean="0"/>
+              <a:t> (n’importe quoi = </a:t>
+            </a:r>
+            <a:r>
+              <a:rPr lang="fr-FR" dirty="0" err="1" smtClean="0"/>
+              <a:t>json</a:t>
+            </a:r>
+            <a:r>
+              <a:rPr lang="fr-FR" dirty="0" smtClean="0"/>
+              <a:t>, </a:t>
+            </a:r>
+            <a:r>
+              <a:rPr lang="fr-FR" dirty="0" err="1" smtClean="0"/>
+              <a:t>xml</a:t>
+            </a:r>
+            <a:r>
+              <a:rPr lang="fr-FR" dirty="0" smtClean="0"/>
+              <a:t>, </a:t>
+            </a:r>
+            <a:r>
+              <a:rPr lang="fr-FR" dirty="0" err="1" smtClean="0"/>
+              <a:t>protobuf</a:t>
+            </a:r>
+            <a:r>
+              <a:rPr lang="fr-FR" dirty="0" smtClean="0"/>
+              <a:t>)</a:t>
+            </a:r>
+          </a:p>
+          <a:p>
+            <a:pPr lvl="1"/>
+            <a:r>
+              <a:rPr lang="fr-FR" dirty="0" err="1" smtClean="0"/>
+              <a:t>Converter</a:t>
+            </a:r>
+            <a:r>
+              <a:rPr lang="fr-FR" dirty="0" smtClean="0"/>
+              <a:t> </a:t>
+            </a:r>
+            <a:r>
+              <a:rPr lang="fr-FR" dirty="0" err="1" smtClean="0"/>
+              <a:t>Retrofit</a:t>
+            </a:r>
+            <a:endParaRPr lang="fr-FR" dirty="0" smtClean="0"/>
+          </a:p>
+          <a:p>
+            <a:pPr lvl="1"/>
+            <a:r>
+              <a:rPr lang="fr-FR" dirty="0" smtClean="0"/>
+              <a:t>Un </a:t>
+            </a:r>
+            <a:r>
+              <a:rPr lang="fr-FR" dirty="0" err="1" smtClean="0"/>
+              <a:t>Sample</a:t>
+            </a:r>
+            <a:r>
+              <a:rPr lang="fr-FR" dirty="0" smtClean="0"/>
+              <a:t> (qui s’interface avec un appli </a:t>
+            </a:r>
+            <a:r>
+              <a:rPr lang="fr-FR" dirty="0" err="1" smtClean="0"/>
+              <a:t>jhipster</a:t>
+            </a:r>
+            <a:r>
+              <a:rPr lang="fr-FR" dirty="0" smtClean="0"/>
+              <a:t>)</a:t>
+            </a:r>
+            <a:endParaRPr lang="fr-FR" dirty="0"/>
+          </a:p>
+        </p:txBody>
+      </p:sp>
+    </p:spTree>
+    <p:extLst>
+      <p:ext uri="{BB962C8B-B14F-4D97-AF65-F5344CB8AC3E}">
+        <p14:creationId xmlns:p14="http://schemas.microsoft.com/office/powerpoint/2010/main" val="3489220342"/>
+      </p:ext>
+    </p:extLst>
+  </p:cSld>
+  <p:clrMapOvr>
+    <a:masterClrMapping/>
+  </p:clrMapOvr>
+</p:sld>
+</file>
+
+<file path=ppt/slides/slide26.xml><?xml version="1.0" encoding="utf-8"?>
+<p:sld xmlns:a="http://schemas.openxmlformats.org/drawingml/2006/main" xmlns:r="http://schemas.openxmlformats.org/officeDocument/2006/relationships" xmlns:p="http://schemas.openxmlformats.org/presentationml/2006/main">
+  <p:cSld>
+    <p:spTree>
+      <p:nvGrpSpPr>
+        <p:cNvPr id="1" name=""/>
+        <p:cNvGrpSpPr/>
+        <p:nvPr/>
+      </p:nvGrpSpPr>
+      <p:grpSpPr>
+        <a:xfrm>
+          <a:off x="0" y="0"/>
+          <a:ext cx="0" cy="0"/>
+          <a:chOff x="0" y="0"/>
+          <a:chExt cx="0" cy="0"/>
+        </a:xfrm>
+      </p:grpSpPr>
+      <p:sp>
+        <p:nvSpPr>
+          <p:cNvPr id="2" name="Titre 1"/>
+          <p:cNvSpPr>
+            <a:spLocks noGrp="1"/>
+          </p:cNvSpPr>
+          <p:nvPr>
+            <p:ph type="title"/>
+          </p:nvPr>
+        </p:nvSpPr>
+        <p:spPr/>
+        <p:txBody>
+          <a:bodyPr/>
+          <a:lstStyle/>
+          <a:p>
+            <a:r>
+              <a:rPr lang="fr-FR" dirty="0" smtClean="0"/>
+              <a:t>Retour au </a:t>
+            </a:r>
+            <a:r>
+              <a:rPr lang="fr-FR" dirty="0" err="1" smtClean="0"/>
+              <a:t>WebService</a:t>
+            </a:r>
+            <a:endParaRPr lang="fr-FR" dirty="0"/>
+          </a:p>
+        </p:txBody>
+      </p:sp>
+      <p:sp>
+        <p:nvSpPr>
+          <p:cNvPr id="3" name="Espace réservé du contenu 2"/>
+          <p:cNvSpPr>
+            <a:spLocks noGrp="1"/>
+          </p:cNvSpPr>
+          <p:nvPr>
+            <p:ph idx="1"/>
+          </p:nvPr>
+        </p:nvSpPr>
+        <p:spPr/>
+        <p:txBody>
+          <a:bodyPr>
+            <a:normAutofit lnSpcReduction="10000"/>
+          </a:bodyPr>
+          <a:lstStyle/>
+          <a:p>
+            <a:r>
+              <a:rPr lang="fr-FR" dirty="0" smtClean="0"/>
+              <a:t>Interface </a:t>
+            </a:r>
+            <a:r>
+              <a:rPr lang="fr-FR" dirty="0" err="1" smtClean="0"/>
+              <a:t>GithubService</a:t>
+            </a:r>
+            <a:r>
+              <a:rPr lang="fr-FR" dirty="0" smtClean="0"/>
+              <a:t> : </a:t>
+            </a:r>
+          </a:p>
+          <a:p>
+            <a:pPr marL="457200" lvl="1" indent="0">
+              <a:buNone/>
+            </a:pPr>
+            <a:r>
+              <a:rPr lang="fr-FR" sz="2000" dirty="0">
+                <a:solidFill>
+                  <a:srgbClr val="808000"/>
+                </a:solidFill>
+              </a:rPr>
+              <a:t>@GET</a:t>
+            </a:r>
+            <a:r>
+              <a:rPr lang="fr-FR" sz="2000" dirty="0"/>
+              <a:t>(</a:t>
+            </a:r>
+            <a:r>
+              <a:rPr lang="fr-FR" sz="2000" b="1" dirty="0">
+                <a:solidFill>
+                  <a:srgbClr val="008000"/>
+                </a:solidFill>
+              </a:rPr>
+              <a:t>"/repos/{user}/{repo}/issues"</a:t>
+            </a:r>
+            <a:r>
+              <a:rPr lang="fr-FR" sz="2000" dirty="0"/>
+              <a:t>)</a:t>
+            </a:r>
+            <a:br>
+              <a:rPr lang="fr-FR" sz="2000" dirty="0"/>
+            </a:br>
+            <a:r>
+              <a:rPr lang="fr-FR" sz="2000" b="1" dirty="0">
+                <a:solidFill>
+                  <a:srgbClr val="000080"/>
+                </a:solidFill>
+              </a:rPr>
+              <a:t>public </a:t>
+            </a:r>
+            <a:r>
+              <a:rPr lang="fr-FR" sz="2000" dirty="0"/>
+              <a:t>List&lt;</a:t>
+            </a:r>
+            <a:r>
+              <a:rPr lang="fr-FR" sz="2000" dirty="0" err="1"/>
+              <a:t>Github.Issue</a:t>
+            </a:r>
+            <a:r>
+              <a:rPr lang="fr-FR" sz="2000" dirty="0"/>
+              <a:t>&gt; </a:t>
+            </a:r>
+            <a:r>
+              <a:rPr lang="fr-FR" sz="2000" dirty="0" err="1"/>
+              <a:t>fetchIssues</a:t>
+            </a:r>
+            <a:r>
+              <a:rPr lang="fr-FR" sz="2000" dirty="0" smtClean="0"/>
+              <a:t>(</a:t>
+            </a:r>
+          </a:p>
+          <a:p>
+            <a:pPr marL="457200" lvl="1" indent="0">
+              <a:buNone/>
+            </a:pPr>
+            <a:r>
+              <a:rPr lang="fr-FR" sz="2000" dirty="0">
+                <a:solidFill>
+                  <a:srgbClr val="808000"/>
+                </a:solidFill>
+              </a:rPr>
+              <a:t>	</a:t>
+            </a:r>
+            <a:r>
+              <a:rPr lang="fr-FR" sz="2000" dirty="0" smtClean="0">
+                <a:solidFill>
+                  <a:srgbClr val="808000"/>
+                </a:solidFill>
+              </a:rPr>
+              <a:t>@</a:t>
+            </a:r>
+            <a:r>
+              <a:rPr lang="fr-FR" sz="2000" dirty="0" err="1">
+                <a:solidFill>
+                  <a:srgbClr val="808000"/>
+                </a:solidFill>
+              </a:rPr>
+              <a:t>Path</a:t>
+            </a:r>
+            <a:r>
+              <a:rPr lang="fr-FR" sz="2000" dirty="0"/>
+              <a:t>(</a:t>
+            </a:r>
+            <a:r>
+              <a:rPr lang="fr-FR" sz="2000" b="1" dirty="0">
+                <a:solidFill>
+                  <a:srgbClr val="008000"/>
+                </a:solidFill>
+              </a:rPr>
+              <a:t>"user"</a:t>
+            </a:r>
+            <a:r>
+              <a:rPr lang="fr-FR" sz="2000" dirty="0"/>
+              <a:t>)String user, </a:t>
+            </a:r>
+            <a:endParaRPr lang="fr-FR" sz="2000" dirty="0" smtClean="0"/>
+          </a:p>
+          <a:p>
+            <a:pPr marL="457200" lvl="1" indent="0">
+              <a:buNone/>
+            </a:pPr>
+            <a:r>
+              <a:rPr lang="fr-FR" sz="2000" dirty="0">
+                <a:solidFill>
+                  <a:srgbClr val="808000"/>
+                </a:solidFill>
+              </a:rPr>
+              <a:t>	</a:t>
+            </a:r>
+            <a:r>
+              <a:rPr lang="fr-FR" sz="2000" dirty="0" smtClean="0">
+                <a:solidFill>
+                  <a:srgbClr val="808000"/>
+                </a:solidFill>
+              </a:rPr>
+              <a:t>@</a:t>
+            </a:r>
+            <a:r>
+              <a:rPr lang="fr-FR" sz="2000" dirty="0" err="1">
+                <a:solidFill>
+                  <a:srgbClr val="808000"/>
+                </a:solidFill>
+              </a:rPr>
+              <a:t>Path</a:t>
+            </a:r>
+            <a:r>
+              <a:rPr lang="fr-FR" sz="2000" dirty="0"/>
+              <a:t>(</a:t>
+            </a:r>
+            <a:r>
+              <a:rPr lang="fr-FR" sz="2000" b="1" dirty="0">
+                <a:solidFill>
+                  <a:srgbClr val="008000"/>
+                </a:solidFill>
+              </a:rPr>
+              <a:t>"repo"</a:t>
+            </a:r>
+            <a:r>
+              <a:rPr lang="fr-FR" sz="2000" dirty="0"/>
+              <a:t>) String repo)</a:t>
+            </a:r>
+            <a:r>
+              <a:rPr lang="fr-FR" sz="2000" dirty="0" smtClean="0"/>
+              <a:t>;</a:t>
+            </a:r>
+          </a:p>
+          <a:p>
+            <a:pPr marL="400050"/>
+            <a:r>
+              <a:rPr lang="fr-FR" sz="2800" dirty="0" smtClean="0"/>
+              <a:t>Adapter et Service : </a:t>
+            </a:r>
+          </a:p>
+          <a:p>
+            <a:pPr marL="514350" lvl="1" indent="0">
+              <a:buNone/>
+            </a:pPr>
+            <a:r>
+              <a:rPr lang="fr-FR" sz="2000" dirty="0" err="1"/>
+              <a:t>RestAdapter</a:t>
+            </a:r>
+            <a:r>
+              <a:rPr lang="fr-FR" sz="2000" dirty="0"/>
+              <a:t> adapter = </a:t>
+            </a:r>
+            <a:r>
+              <a:rPr lang="fr-FR" sz="2000" b="1" dirty="0">
+                <a:solidFill>
+                  <a:srgbClr val="000080"/>
+                </a:solidFill>
+              </a:rPr>
+              <a:t>new </a:t>
+            </a:r>
+            <a:r>
+              <a:rPr lang="fr-FR" sz="2000" dirty="0" err="1"/>
+              <a:t>RestAdapter.Builder</a:t>
+            </a:r>
+            <a:r>
+              <a:rPr lang="fr-FR" sz="2000" dirty="0"/>
+              <a:t>()</a:t>
+            </a:r>
+            <a:br>
+              <a:rPr lang="fr-FR" sz="2000" dirty="0"/>
+            </a:br>
+            <a:r>
+              <a:rPr lang="fr-FR" sz="2000" dirty="0"/>
+              <a:t>        .</a:t>
+            </a:r>
+            <a:r>
+              <a:rPr lang="fr-FR" sz="2000" dirty="0" err="1"/>
+              <a:t>setConverter</a:t>
+            </a:r>
+            <a:r>
+              <a:rPr lang="fr-FR" sz="2000" dirty="0"/>
+              <a:t>(</a:t>
+            </a:r>
+            <a:r>
+              <a:rPr lang="fr-FR" sz="2000" b="1" dirty="0">
+                <a:solidFill>
+                  <a:srgbClr val="000080"/>
+                </a:solidFill>
+              </a:rPr>
+              <a:t>new </a:t>
+            </a:r>
+            <a:r>
+              <a:rPr lang="fr-FR" sz="2000" dirty="0" err="1"/>
+              <a:t>AnyProtoConverter</a:t>
+            </a:r>
+            <a:r>
+              <a:rPr lang="fr-FR" sz="2000" dirty="0"/>
+              <a:t>())</a:t>
+            </a:r>
+            <a:br>
+              <a:rPr lang="fr-FR" sz="2000" dirty="0"/>
+            </a:br>
+            <a:r>
+              <a:rPr lang="fr-FR" sz="2000" dirty="0"/>
+              <a:t>        .</a:t>
+            </a:r>
+            <a:r>
+              <a:rPr lang="fr-FR" sz="2000" dirty="0" err="1"/>
+              <a:t>setEndpoint</a:t>
+            </a:r>
+            <a:r>
+              <a:rPr lang="fr-FR" sz="2000" dirty="0"/>
+              <a:t>(</a:t>
+            </a:r>
+            <a:r>
+              <a:rPr lang="fr-FR" sz="2000" b="1" dirty="0">
+                <a:solidFill>
+                  <a:srgbClr val="008000"/>
+                </a:solidFill>
+              </a:rPr>
+              <a:t>"</a:t>
+            </a:r>
+            <a:r>
+              <a:rPr lang="fr-FR" sz="2000" b="1" dirty="0" err="1">
+                <a:solidFill>
+                  <a:srgbClr val="008000"/>
+                </a:solidFill>
+              </a:rPr>
+              <a:t>https</a:t>
+            </a:r>
+            <a:r>
+              <a:rPr lang="fr-FR" sz="2000" b="1" dirty="0">
+                <a:solidFill>
+                  <a:srgbClr val="008000"/>
+                </a:solidFill>
+              </a:rPr>
+              <a:t>://</a:t>
+            </a:r>
+            <a:r>
+              <a:rPr lang="fr-FR" sz="2000" b="1" dirty="0" err="1">
+                <a:solidFill>
+                  <a:srgbClr val="008000"/>
+                </a:solidFill>
+              </a:rPr>
+              <a:t>api.github.com</a:t>
+            </a:r>
+            <a:r>
+              <a:rPr lang="fr-FR" sz="2000" b="1" dirty="0">
+                <a:solidFill>
+                  <a:srgbClr val="008000"/>
+                </a:solidFill>
+              </a:rPr>
+              <a:t>"</a:t>
+            </a:r>
+            <a:r>
+              <a:rPr lang="fr-FR" sz="2000" dirty="0"/>
+              <a:t>)</a:t>
+            </a:r>
+            <a:br>
+              <a:rPr lang="fr-FR" sz="2000" dirty="0"/>
+            </a:br>
+            <a:r>
+              <a:rPr lang="fr-FR" sz="2000" dirty="0"/>
+              <a:t>        .</a:t>
+            </a:r>
+            <a:r>
+              <a:rPr lang="fr-FR" sz="2000" dirty="0" err="1"/>
+              <a:t>build</a:t>
+            </a:r>
+            <a:r>
+              <a:rPr lang="fr-FR" sz="2000" dirty="0"/>
+              <a:t>();</a:t>
+            </a:r>
+            <a:br>
+              <a:rPr lang="fr-FR" sz="2000" dirty="0"/>
+            </a:br>
+            <a:r>
+              <a:rPr lang="fr-FR" sz="2000" dirty="0"/>
+              <a:t/>
+            </a:r>
+            <a:br>
+              <a:rPr lang="fr-FR" sz="2000" dirty="0"/>
+            </a:br>
+            <a:r>
+              <a:rPr lang="fr-FR" sz="2000" dirty="0" err="1"/>
+              <a:t>GithubService</a:t>
+            </a:r>
+            <a:r>
+              <a:rPr lang="fr-FR" sz="2000" dirty="0"/>
+              <a:t> </a:t>
+            </a:r>
+            <a:r>
+              <a:rPr lang="fr-FR" sz="2000" dirty="0" err="1"/>
+              <a:t>githubService</a:t>
+            </a:r>
+            <a:r>
+              <a:rPr lang="fr-FR" sz="2000" dirty="0"/>
+              <a:t> = </a:t>
+            </a:r>
+            <a:r>
+              <a:rPr lang="fr-FR" sz="2000" dirty="0" err="1"/>
+              <a:t>adapter.create</a:t>
+            </a:r>
+            <a:r>
+              <a:rPr lang="fr-FR" sz="2000" dirty="0"/>
+              <a:t>(</a:t>
+            </a:r>
+            <a:r>
+              <a:rPr lang="fr-FR" sz="2000" dirty="0" err="1"/>
+              <a:t>GithubService.</a:t>
+            </a:r>
+            <a:r>
+              <a:rPr lang="fr-FR" sz="2000" b="1" dirty="0" err="1">
+                <a:solidFill>
+                  <a:srgbClr val="000080"/>
+                </a:solidFill>
+              </a:rPr>
+              <a:t>class</a:t>
+            </a:r>
+            <a:r>
+              <a:rPr lang="fr-FR" sz="2000" dirty="0"/>
+              <a:t>);</a:t>
+            </a:r>
+            <a:br>
+              <a:rPr lang="fr-FR" sz="2000" dirty="0"/>
+            </a:br>
+            <a:endParaRPr lang="fr-FR" sz="2000" dirty="0"/>
+          </a:p>
+        </p:txBody>
+      </p:sp>
+    </p:spTree>
+    <p:extLst>
+      <p:ext uri="{BB962C8B-B14F-4D97-AF65-F5344CB8AC3E}">
+        <p14:creationId xmlns:p14="http://schemas.microsoft.com/office/powerpoint/2010/main" val="3659280804"/>
+      </p:ext>
+    </p:extLst>
+  </p:cSld>
+  <p:clrMapOvr>
+    <a:masterClrMapping/>
+  </p:clrMapOvr>
+</p:sld>
+</file>
+
+<file path=ppt/slides/slide27.xml><?xml version="1.0" encoding="utf-8"?>
+<p:sld xmlns:a="http://schemas.openxmlformats.org/drawingml/2006/main" xmlns:r="http://schemas.openxmlformats.org/officeDocument/2006/relationships" xmlns:p="http://schemas.openxmlformats.org/presentationml/2006/main">
+  <p:cSld>
+    <p:spTree>
+      <p:nvGrpSpPr>
+        <p:cNvPr id="1" name=""/>
+        <p:cNvGrpSpPr/>
+        <p:nvPr/>
+      </p:nvGrpSpPr>
+      <p:grpSpPr>
+        <a:xfrm>
+          <a:off x="0" y="0"/>
+          <a:ext cx="0" cy="0"/>
+          <a:chOff x="0" y="0"/>
+          <a:chExt cx="0" cy="0"/>
+        </a:xfrm>
+      </p:grpSpPr>
+      <p:sp>
+        <p:nvSpPr>
+          <p:cNvPr id="2" name="Titre 1"/>
+          <p:cNvSpPr>
+            <a:spLocks noGrp="1"/>
+          </p:cNvSpPr>
+          <p:nvPr>
+            <p:ph type="title"/>
+          </p:nvPr>
+        </p:nvSpPr>
+        <p:spPr/>
+        <p:txBody>
+          <a:bodyPr/>
+          <a:lstStyle/>
+          <a:p>
+            <a:pPr algn="ctr"/>
+            <a:r>
+              <a:rPr lang="fr-FR" dirty="0" smtClean="0"/>
+              <a:t>DEMO</a:t>
+            </a:r>
+            <a:endParaRPr lang="fr-FR" dirty="0"/>
+          </a:p>
+        </p:txBody>
+      </p:sp>
+      <p:sp>
+        <p:nvSpPr>
+          <p:cNvPr id="3" name="Espace réservé du texte 2"/>
+          <p:cNvSpPr>
+            <a:spLocks noGrp="1"/>
+          </p:cNvSpPr>
+          <p:nvPr>
+            <p:ph type="body" idx="1"/>
+          </p:nvPr>
+        </p:nvSpPr>
+        <p:spPr/>
+        <p:txBody>
+          <a:bodyPr/>
+          <a:lstStyle/>
+          <a:p>
+            <a:endParaRPr lang="fr-FR"/>
+          </a:p>
+        </p:txBody>
+      </p:sp>
+    </p:spTree>
+    <p:extLst>
+      <p:ext uri="{BB962C8B-B14F-4D97-AF65-F5344CB8AC3E}">
+        <p14:creationId xmlns:p14="http://schemas.microsoft.com/office/powerpoint/2010/main" val="1289220739"/>
+      </p:ext>
+    </p:extLst>
+  </p:cSld>
+  <p:clrMapOvr>
+    <a:masterClrMapping/>
+  </p:clrMapOvr>
+</p:sld>
+</file>
+
+<file path=ppt/slides/slide28.xml><?xml version="1.0" encoding="utf-8"?>
+<p:sld xmlns:a="http://schemas.openxmlformats.org/drawingml/2006/main" xmlns:r="http://schemas.openxmlformats.org/officeDocument/2006/relationships" xmlns:p="http://schemas.openxmlformats.org/presentationml/2006/main">
+  <p:cSld>
+    <p:spTree>
+      <p:nvGrpSpPr>
+        <p:cNvPr id="1" name=""/>
+        <p:cNvGrpSpPr/>
+        <p:nvPr/>
+      </p:nvGrpSpPr>
+      <p:grpSpPr>
+        <a:xfrm>
+          <a:off x="0" y="0"/>
+          <a:ext cx="0" cy="0"/>
+          <a:chOff x="0" y="0"/>
+          <a:chExt cx="0" cy="0"/>
+        </a:xfrm>
+      </p:grpSpPr>
+      <p:sp>
+        <p:nvSpPr>
+          <p:cNvPr id="2" name="Titre 1"/>
+          <p:cNvSpPr>
+            <a:spLocks noGrp="1"/>
+          </p:cNvSpPr>
+          <p:nvPr>
+            <p:ph type="title"/>
+          </p:nvPr>
+        </p:nvSpPr>
+        <p:spPr/>
+        <p:txBody>
+          <a:bodyPr/>
+          <a:lstStyle/>
+          <a:p>
+            <a:r>
+              <a:rPr lang="fr-FR" dirty="0" smtClean="0"/>
+              <a:t>Stockage Local</a:t>
+            </a:r>
+            <a:endParaRPr lang="fr-FR" dirty="0"/>
+          </a:p>
+        </p:txBody>
+      </p:sp>
+      <p:sp>
+        <p:nvSpPr>
+          <p:cNvPr id="3" name="Espace réservé du contenu 2"/>
+          <p:cNvSpPr>
+            <a:spLocks noGrp="1"/>
+          </p:cNvSpPr>
+          <p:nvPr>
+            <p:ph idx="1"/>
+          </p:nvPr>
+        </p:nvSpPr>
+        <p:spPr/>
+        <p:txBody>
+          <a:bodyPr/>
+          <a:lstStyle/>
+          <a:p>
+            <a:endParaRPr lang="fr-FR"/>
+          </a:p>
+        </p:txBody>
+      </p:sp>
+    </p:spTree>
+    <p:extLst>
+      <p:ext uri="{BB962C8B-B14F-4D97-AF65-F5344CB8AC3E}">
+        <p14:creationId xmlns:p14="http://schemas.microsoft.com/office/powerpoint/2010/main" val="3776416461"/>
+      </p:ext>
+    </p:extLst>
+  </p:cSld>
+  <p:clrMapOvr>
+    <a:masterClrMapping/>
+  </p:clrMapOvr>
+</p:sld>
+</file>
+
+<file path=ppt/slides/slide29.xml><?xml version="1.0" encoding="utf-8"?>
+<p:sld xmlns:a="http://schemas.openxmlformats.org/drawingml/2006/main" xmlns:r="http://schemas.openxmlformats.org/officeDocument/2006/relationships" xmlns:p="http://schemas.openxmlformats.org/presentationml/2006/main">
+  <p:cSld>
+    <p:spTree>
+      <p:nvGrpSpPr>
+        <p:cNvPr id="1" name=""/>
+        <p:cNvGrpSpPr/>
+        <p:nvPr/>
+      </p:nvGrpSpPr>
+      <p:grpSpPr>
+        <a:xfrm>
+          <a:off x="0" y="0"/>
+          <a:ext cx="0" cy="0"/>
+          <a:chOff x="0" y="0"/>
+          <a:chExt cx="0" cy="0"/>
+        </a:xfrm>
+      </p:grpSpPr>
+      <p:sp>
+        <p:nvSpPr>
+          <p:cNvPr id="2" name="Titre 1"/>
+          <p:cNvSpPr>
+            <a:spLocks noGrp="1"/>
+          </p:cNvSpPr>
+          <p:nvPr>
+            <p:ph type="title"/>
+          </p:nvPr>
+        </p:nvSpPr>
+        <p:spPr/>
+        <p:txBody>
+          <a:bodyPr/>
+          <a:lstStyle/>
+          <a:p>
+            <a:r>
+              <a:rPr lang="fr-FR" dirty="0" err="1" smtClean="0"/>
+              <a:t>Conlusion</a:t>
+            </a:r>
+            <a:r>
+              <a:rPr lang="fr-FR" dirty="0" smtClean="0"/>
+              <a:t> : La panacée ?</a:t>
+            </a:r>
+            <a:endParaRPr lang="fr-FR" dirty="0"/>
+          </a:p>
+        </p:txBody>
+      </p:sp>
+      <p:sp>
+        <p:nvSpPr>
+          <p:cNvPr id="3" name="Espace réservé du contenu 2"/>
+          <p:cNvSpPr>
+            <a:spLocks noGrp="1"/>
+          </p:cNvSpPr>
+          <p:nvPr>
+            <p:ph idx="1"/>
+          </p:nvPr>
+        </p:nvSpPr>
+        <p:spPr/>
+        <p:txBody>
+          <a:bodyPr/>
+          <a:lstStyle/>
+          <a:p>
+            <a:r>
+              <a:rPr lang="fr-FR" dirty="0" smtClean="0"/>
+              <a:t>On tape correctement notre </a:t>
+            </a:r>
+            <a:r>
+              <a:rPr lang="fr-FR" dirty="0" err="1" smtClean="0"/>
+              <a:t>webservice</a:t>
+            </a:r>
+            <a:endParaRPr lang="fr-FR" dirty="0" smtClean="0"/>
+          </a:p>
+          <a:p>
+            <a:endParaRPr lang="fr-FR" dirty="0"/>
+          </a:p>
+          <a:p>
+            <a:r>
+              <a:rPr lang="fr-FR" dirty="0" smtClean="0"/>
+              <a:t>On a notre </a:t>
+            </a:r>
+            <a:r>
+              <a:rPr lang="fr-FR" dirty="0" err="1" smtClean="0"/>
+              <a:t>storage</a:t>
+            </a:r>
+            <a:r>
+              <a:rPr lang="fr-FR" dirty="0" smtClean="0"/>
+              <a:t> local relativement simple</a:t>
+            </a:r>
+          </a:p>
+          <a:p>
+            <a:endParaRPr lang="fr-FR" dirty="0"/>
+          </a:p>
+          <a:p>
+            <a:r>
+              <a:rPr lang="fr-FR" dirty="0" smtClean="0"/>
+              <a:t>On a une application télé-paramétrable </a:t>
+            </a:r>
+          </a:p>
+          <a:p>
+            <a:endParaRPr lang="fr-FR" dirty="0"/>
+          </a:p>
+          <a:p>
+            <a:r>
+              <a:rPr lang="fr-FR" dirty="0" smtClean="0"/>
+              <a:t>MAIS : on n’a pas fait d’édition locale.</a:t>
+            </a:r>
+            <a:endParaRPr lang="fr-FR" dirty="0"/>
+          </a:p>
+        </p:txBody>
+      </p:sp>
+    </p:spTree>
+    <p:extLst>
+      <p:ext uri="{BB962C8B-B14F-4D97-AF65-F5344CB8AC3E}">
+        <p14:creationId xmlns:p14="http://schemas.microsoft.com/office/powerpoint/2010/main" val="3950536386"/>
+      </p:ext>
+    </p:extLst>
+  </p:cSld>
+  <p:clrMapOvr>
+    <a:masterClrMapping/>
+  </p:clrMapOvr>
+</p:sld>
+</file>
+
 <file path=ppt/slides/slide3.xml><?xml version="1.0" encoding="utf-8"?>
 <p:sld xmlns:a="http://schemas.openxmlformats.org/drawingml/2006/main" xmlns:r="http://schemas.openxmlformats.org/officeDocument/2006/relationships" xmlns:p="http://schemas.openxmlformats.org/presentationml/2006/main">
   <p:cSld>
@@ -4136,6 +7310,108 @@
     <p:extLst>
       <p:ext uri="{BB962C8B-B14F-4D97-AF65-F5344CB8AC3E}">
         <p14:creationId xmlns:p14="http://schemas.microsoft.com/office/powerpoint/2010/main" val="929143633"/>
+      </p:ext>
+    </p:extLst>
+  </p:cSld>
+  <p:clrMapOvr>
+    <a:masterClrMapping/>
+  </p:clrMapOvr>
+</p:sld>
+</file>
+
+<file path=ppt/slides/slide30.xml><?xml version="1.0" encoding="utf-8"?>
+<p:sld xmlns:a="http://schemas.openxmlformats.org/drawingml/2006/main" xmlns:r="http://schemas.openxmlformats.org/officeDocument/2006/relationships" xmlns:p="http://schemas.openxmlformats.org/presentationml/2006/main">
+  <p:cSld>
+    <p:spTree>
+      <p:nvGrpSpPr>
+        <p:cNvPr id="1" name=""/>
+        <p:cNvGrpSpPr/>
+        <p:nvPr/>
+      </p:nvGrpSpPr>
+      <p:grpSpPr>
+        <a:xfrm>
+          <a:off x="0" y="0"/>
+          <a:ext cx="0" cy="0"/>
+          <a:chOff x="0" y="0"/>
+          <a:chExt cx="0" cy="0"/>
+        </a:xfrm>
+      </p:grpSpPr>
+      <p:sp>
+        <p:nvSpPr>
+          <p:cNvPr id="2" name="Titre 1"/>
+          <p:cNvSpPr>
+            <a:spLocks noGrp="1"/>
+          </p:cNvSpPr>
+          <p:nvPr>
+            <p:ph type="title"/>
+          </p:nvPr>
+        </p:nvSpPr>
+        <p:spPr/>
+        <p:txBody>
+          <a:bodyPr/>
+          <a:lstStyle/>
+          <a:p>
+            <a:r>
+              <a:rPr lang="fr-FR" dirty="0" smtClean="0"/>
+              <a:t>Conclusion Bis</a:t>
+            </a:r>
+            <a:endParaRPr lang="fr-FR" dirty="0"/>
+          </a:p>
+        </p:txBody>
+      </p:sp>
+      <p:sp>
+        <p:nvSpPr>
+          <p:cNvPr id="3" name="Espace réservé du contenu 2"/>
+          <p:cNvSpPr>
+            <a:spLocks noGrp="1"/>
+          </p:cNvSpPr>
+          <p:nvPr>
+            <p:ph idx="1"/>
+          </p:nvPr>
+        </p:nvSpPr>
+        <p:spPr/>
+        <p:txBody>
+          <a:bodyPr/>
+          <a:lstStyle/>
+          <a:p>
+            <a:r>
+              <a:rPr lang="fr-FR" dirty="0" smtClean="0"/>
+              <a:t>Mécanique applicable à n’importe quel outil/librairie</a:t>
+            </a:r>
+          </a:p>
+          <a:p>
+            <a:endParaRPr lang="fr-FR" dirty="0" smtClean="0"/>
+          </a:p>
+          <a:p>
+            <a:r>
+              <a:rPr lang="fr-FR" dirty="0" smtClean="0"/>
+              <a:t>Faire l’inventaire des avantages et inconvénients</a:t>
+            </a:r>
+            <a:endParaRPr lang="fr-FR" dirty="0"/>
+          </a:p>
+          <a:p>
+            <a:endParaRPr lang="fr-FR" dirty="0"/>
+          </a:p>
+          <a:p>
+            <a:r>
+              <a:rPr lang="fr-FR" dirty="0" smtClean="0"/>
+              <a:t>Exemple : </a:t>
+            </a:r>
+          </a:p>
+          <a:p>
+            <a:pPr lvl="1"/>
+            <a:r>
+              <a:rPr lang="fr-FR" dirty="0" smtClean="0"/>
+              <a:t>Bus de communication via chat IRC.</a:t>
+            </a:r>
+            <a:endParaRPr lang="fr-FR" dirty="0"/>
+          </a:p>
+        </p:txBody>
+      </p:sp>
+    </p:spTree>
+    <p:extLst>
+      <p:ext uri="{BB962C8B-B14F-4D97-AF65-F5344CB8AC3E}">
+        <p14:creationId xmlns:p14="http://schemas.microsoft.com/office/powerpoint/2010/main" val="1318296312"/>
       </p:ext>
     </p:extLst>
   </p:cSld>
@@ -4269,8 +7545,32 @@
         </p:nvSpPr>
         <p:spPr/>
         <p:txBody>
-          <a:bodyPr/>
-          <a:lstStyle/>
+          <a:bodyPr>
+            <a:normAutofit lnSpcReduction="10000"/>
+          </a:bodyPr>
+          <a:lstStyle/>
+          <a:p>
+            <a:r>
+              <a:rPr lang="fr-FR" dirty="0" err="1" smtClean="0"/>
+              <a:t>Aka</a:t>
+            </a:r>
+            <a:r>
+              <a:rPr lang="fr-FR" dirty="0" smtClean="0"/>
+              <a:t> Protocol Buffers</a:t>
+            </a:r>
+          </a:p>
+          <a:p>
+            <a:endParaRPr lang="fr-FR" dirty="0"/>
+          </a:p>
+          <a:p>
+            <a:r>
+              <a:rPr lang="fr-FR" dirty="0" smtClean="0"/>
+              <a:t>Langage de sérialisation binaire</a:t>
+            </a:r>
+          </a:p>
+          <a:p>
+            <a:endParaRPr lang="fr-FR" dirty="0" smtClean="0"/>
+          </a:p>
           <a:p>
             <a:r>
               <a:rPr lang="fr-FR" dirty="0" smtClean="0"/>
@@ -4384,7 +7684,42 @@
             <a:pPr lvl="1"/>
             <a:r>
               <a:rPr lang="fr-FR" dirty="0" smtClean="0"/>
-              <a:t>Un générateur de code</a:t>
+              <a:t>Un générateur de code </a:t>
+            </a:r>
+          </a:p>
+          <a:p>
+            <a:pPr lvl="2"/>
+            <a:r>
+              <a:rPr lang="fr-FR" dirty="0" err="1" smtClean="0"/>
+              <a:t>Protoc</a:t>
+            </a:r>
+            <a:r>
+              <a:rPr lang="fr-FR" dirty="0" smtClean="0"/>
+              <a:t> (pour </a:t>
+            </a:r>
+            <a:r>
+              <a:rPr lang="fr-FR" b="1" dirty="0" err="1"/>
+              <a:t>P</a:t>
+            </a:r>
+            <a:r>
+              <a:rPr lang="fr-FR" b="1" dirty="0" err="1" smtClean="0"/>
+              <a:t>roto</a:t>
+            </a:r>
+            <a:r>
+              <a:rPr lang="fr-FR" dirty="0" err="1" smtClean="0"/>
+              <a:t>buf</a:t>
+            </a:r>
+            <a:r>
+              <a:rPr lang="fr-FR" dirty="0" smtClean="0"/>
+              <a:t> </a:t>
+            </a:r>
+            <a:r>
+              <a:rPr lang="fr-FR" b="1" dirty="0" smtClean="0"/>
+              <a:t>C</a:t>
+            </a:r>
+            <a:r>
+              <a:rPr lang="fr-FR" dirty="0" smtClean="0"/>
+              <a:t>ompiler)</a:t>
             </a:r>
           </a:p>
           <a:p>
@@ -4701,8 +8036,22 @@
         </p:nvSpPr>
         <p:spPr/>
         <p:txBody>
-          <a:bodyPr/>
-          <a:lstStyle/>
+          <a:bodyPr>
+            <a:normAutofit fontScale="85000" lnSpcReduction="20000"/>
+          </a:bodyPr>
+          <a:lstStyle/>
+          <a:p>
+            <a:endParaRPr lang="fr-FR" dirty="0" smtClean="0"/>
+          </a:p>
+          <a:p>
+            <a:r>
+              <a:rPr lang="fr-FR" dirty="0"/>
+              <a:t>Le fichier généré est relativement imbittable </a:t>
+            </a:r>
+          </a:p>
+          <a:p>
+            <a:endParaRPr lang="fr-FR" dirty="0" smtClean="0"/>
+          </a:p>
           <a:p>
             <a:r>
               <a:rPr lang="fr-FR" dirty="0" smtClean="0"/>

</xml_diff>